<commit_message>
Added data to fetch
</commit_message>
<xml_diff>
--- a/status_report.pptx
+++ b/status_report.pptx
@@ -11,9 +11,6 @@
     <p:sldId id="259" r:id="rId10"/>
     <p:sldId id="260" r:id="rId11"/>
     <p:sldId id="261" r:id="rId12"/>
-    <p:sldId id="262" r:id="rId13"/>
-    <p:sldId id="263" r:id="rId14"/>
-    <p:sldId id="264" r:id="rId15"/>
   </p:sldIdLst>
   <p:sldSz cx="9144000" cy="6858000" type="screen4x3"/>
   <p:notesSz cx="6858000" cy="9144000"/>
@@ -133,438 +130,76 @@
               <c:strCache>
                 <c:ptCount val="1"/>
                 <c:pt idx="0">
-                  <c:v>count</c:v>
+                  <c:v>Job Count</c:v>
                 </c:pt>
               </c:strCache>
             </c:strRef>
           </c:tx>
+          <c:dLbls>
+            <c:numFmt formatCode="#,##0" sourceLinked="0"/>
+            <c:txPr>
+              <a:bodyPr/>
+              <a:lstStyle/>
+              <a:p>
+                <a:pPr>
+                  <a:defRPr sz="1200">
+                    <a:latin typeface="Arial"/>
+                  </a:defRPr>
+                </a:pPr>
+              </a:p>
+            </c:txPr>
+            <c:showLegendKey val="0"/>
+            <c:showVal val="1"/>
+            <c:showCatName val="0"/>
+            <c:showSerName val="0"/>
+            <c:showPercent val="0"/>
+            <c:showBubbleSize val="0"/>
+            <c:showLeaderLines val="1"/>
+          </c:dLbls>
           <c:cat>
-            <c:strRef>
-              <c:f>Sheet1!$A$2:$A$3</c:f>
-              <c:strCache>
-                <c:ptCount val="2"/>
+            <c:numRef>
+              <c:f>Sheet1!$A$2:$A$6</c:f>
+              <c:numCache>
+                <c:formatCode>General</c:formatCode>
+                <c:ptCount val="5"/>
                 <c:pt idx="0">
-                  <c:v>Job Count</c:v>
+                  <c:v>7</c:v>
                 </c:pt>
                 <c:pt idx="1">
-                  <c:v>Cancelled Job Count</c:v>
-                </c:pt>
-              </c:strCache>
-            </c:strRef>
-          </c:cat>
-          <c:val>
-            <c:numRef>
-              <c:f>Sheet1!$B$2:$B$3</c:f>
-              <c:numCache>
-                <c:formatCode>General</c:formatCode>
-                <c:ptCount val="2"/>
-                <c:pt idx="0">
-                  <c:v>590189</c:v>
-                </c:pt>
-                <c:pt idx="1">
-                  <c:v>8</c:v>
-                </c:pt>
-              </c:numCache>
-            </c:numRef>
-          </c:val>
-        </c:ser>
-        <c:axId val="-2068027336"/>
-        <c:axId val="-2113994440"/>
-      </c:barChart>
-      <c:catAx>
-        <c:axId val="-2068027336"/>
-        <c:scaling>
-          <c:orientation val="minMax"/>
-        </c:scaling>
-        <c:delete val="0"/>
-        <c:axPos val="b"/>
-        <c:majorTickMark val="out"/>
-        <c:minorTickMark val="none"/>
-        <c:tickLblPos val="nextTo"/>
-        <c:crossAx val="-2113994440"/>
-        <c:crosses val="autoZero"/>
-        <c:auto val="1"/>
-        <c:lblAlgn val="ctr"/>
-        <c:lblOffset val="100"/>
-        <c:noMultiLvlLbl val="0"/>
-      </c:catAx>
-      <c:valAx>
-        <c:axId val="-2113994440"/>
-        <c:scaling/>
-        <c:delete val="0"/>
-        <c:axPos val="l"/>
-        <c:majorGridlines/>
-        <c:majorTickMark val="out"/>
-        <c:minorTickMark val="none"/>
-        <c:tickLblPos val="nextTo"/>
-        <c:crossAx val="-2068027336"/>
-        <c:crosses val="autoZero"/>
-      </c:valAx>
-    </c:plotArea>
-    <c:dispBlanksAs val="gap"/>
-  </c:chart>
-  <c:txPr>
-    <a:bodyPr/>
-    <a:lstStyle/>
-    <a:p>
-      <a:pPr>
-        <a:defRPr sz="1800"/>
-      </a:pPr>
-      <a:endParaRPr lang="en-US"/>
-    </a:p>
-  </c:txPr>
-  <c:externalData r:id="rId1">
-    <c:autoUpdate val="0"/>
-  </c:externalData>
-</c:chartSpace>
-</file>
-
-<file path=ppt/charts/chart2.xml><?xml version="1.0" encoding="utf-8"?>
-<c:chartSpace xmlns:c="http://schemas.openxmlformats.org/drawingml/2006/chart" xmlns:a="http://schemas.openxmlformats.org/drawingml/2006/main" xmlns:r="http://schemas.openxmlformats.org/officeDocument/2006/relationships">
-  <c:date1904 val="0"/>
-  <c:chart>
-    <c:autoTitleDeleted val="0"/>
-    <c:plotArea>
-      <c:barChart>
-        <c:barDir val="col"/>
-        <c:grouping val="clustered"/>
-        <c:ser>
-          <c:idx val="0"/>
-          <c:order val="0"/>
-          <c:tx>
-            <c:strRef>
-              <c:f>Sheet1!$B$1</c:f>
-              <c:strCache>
-                <c:ptCount val="1"/>
-                <c:pt idx="0">
-                  <c:v>count</c:v>
-                </c:pt>
-              </c:strCache>
-            </c:strRef>
-          </c:tx>
-          <c:cat>
-            <c:strRef>
-              <c:f>Sheet1!$A$2:$A$9</c:f>
-              <c:strCache>
-                <c:ptCount val="8"/>
-                <c:pt idx="0">
-                  <c:v>VSDTEXCEPTION</c:v>
-                </c:pt>
-                <c:pt idx="1">
-                  <c:v>TIMEOUTEXCEPTION</c:v>
+                  <c:v>6</c:v>
                 </c:pt>
                 <c:pt idx="2">
-                  <c:v>FIDEXCEPTION</c:v>
+                  <c:v>5</c:v>
                 </c:pt>
                 <c:pt idx="3">
-                  <c:v>FIDEXCEPTION,VSDTEXCEPTION</c:v>
-                </c:pt>
-                <c:pt idx="4">
-                  <c:v>EXCEPTION</c:v>
-                </c:pt>
-                <c:pt idx="5">
-                  <c:v>SENTTOLEGACY</c:v>
-                </c:pt>
-                <c:pt idx="6">
-                  <c:v>MEEXCEPTION, PAFIEXCEPTION, VSDTEXCEPTION</c:v>
-                </c:pt>
-                <c:pt idx="7">
-                  <c:v>DAMAGEDFILE</c:v>
-                </c:pt>
-              </c:strCache>
-            </c:strRef>
-          </c:cat>
-          <c:val>
-            <c:numRef>
-              <c:f>Sheet1!$B$2:$B$9</c:f>
-              <c:numCache>
-                <c:formatCode>General</c:formatCode>
-                <c:ptCount val="8"/>
-                <c:pt idx="0">
-                  <c:v>2</c:v>
-                </c:pt>
-                <c:pt idx="1">
-                  <c:v>4650</c:v>
-                </c:pt>
-                <c:pt idx="2">
-                  <c:v>2</c:v>
-                </c:pt>
-                <c:pt idx="3">
-                  <c:v>1</c:v>
+                  <c:v>4</c:v>
                 </c:pt>
                 <c:pt idx="4">
                   <c:v>3</c:v>
                 </c:pt>
-                <c:pt idx="5">
-                  <c:v>1</c:v>
-                </c:pt>
-                <c:pt idx="6">
-                  <c:v>1</c:v>
-                </c:pt>
-                <c:pt idx="7">
-                  <c:v>1</c:v>
-                </c:pt>
               </c:numCache>
             </c:numRef>
-          </c:val>
-        </c:ser>
-        <c:axId val="-2068027336"/>
-        <c:axId val="-2113994440"/>
-      </c:barChart>
-      <c:catAx>
-        <c:axId val="-2068027336"/>
-        <c:scaling>
-          <c:orientation val="minMax"/>
-        </c:scaling>
-        <c:delete val="0"/>
-        <c:axPos val="b"/>
-        <c:majorTickMark val="out"/>
-        <c:minorTickMark val="none"/>
-        <c:tickLblPos val="nextTo"/>
-        <c:crossAx val="-2113994440"/>
-        <c:crosses val="autoZero"/>
-        <c:auto val="1"/>
-        <c:lblAlgn val="ctr"/>
-        <c:lblOffset val="100"/>
-        <c:noMultiLvlLbl val="0"/>
-      </c:catAx>
-      <c:valAx>
-        <c:axId val="-2113994440"/>
-        <c:scaling/>
-        <c:delete val="0"/>
-        <c:axPos val="l"/>
-        <c:majorGridlines/>
-        <c:majorTickMark val="out"/>
-        <c:minorTickMark val="none"/>
-        <c:tickLblPos val="nextTo"/>
-        <c:crossAx val="-2068027336"/>
-        <c:crosses val="autoZero"/>
-      </c:valAx>
-    </c:plotArea>
-    <c:dispBlanksAs val="gap"/>
-  </c:chart>
-  <c:txPr>
-    <a:bodyPr/>
-    <a:lstStyle/>
-    <a:p>
-      <a:pPr>
-        <a:defRPr sz="1800"/>
-      </a:pPr>
-      <a:endParaRPr lang="en-US"/>
-    </a:p>
-  </c:txPr>
-  <c:externalData r:id="rId1">
-    <c:autoUpdate val="0"/>
-  </c:externalData>
-</c:chartSpace>
-</file>
-
-<file path=ppt/charts/chart3.xml><?xml version="1.0" encoding="utf-8"?>
-<c:chartSpace xmlns:c="http://schemas.openxmlformats.org/drawingml/2006/chart" xmlns:a="http://schemas.openxmlformats.org/drawingml/2006/main" xmlns:r="http://schemas.openxmlformats.org/officeDocument/2006/relationships">
-  <c:date1904 val="0"/>
-  <c:chart>
-    <c:autoTitleDeleted val="0"/>
-    <c:plotArea>
-      <c:barChart>
-        <c:barDir val="col"/>
-        <c:grouping val="clustered"/>
-        <c:ser>
-          <c:idx val="0"/>
-          <c:order val="0"/>
-          <c:tx>
-            <c:strRef>
-              <c:f>Sheet1!$B$1</c:f>
-              <c:strCache>
-                <c:ptCount val="1"/>
-                <c:pt idx="0">
-                  <c:v>Count</c:v>
-                </c:pt>
-              </c:strCache>
-            </c:strRef>
-          </c:tx>
-          <c:cat>
-            <c:strRef>
-              <c:f>Sheet1!$A$2:$A$7</c:f>
-              <c:strCache>
-                <c:ptCount val="6"/>
-                <c:pt idx="0">
-                  <c:v>Total Files</c:v>
-                </c:pt>
-                <c:pt idx="1">
-                  <c:v>Processed Files</c:v>
-                </c:pt>
-                <c:pt idx="2">
-                  <c:v>Deduplicated Files</c:v>
-                </c:pt>
-                <c:pt idx="3">
-                  <c:v>Duplicate Groups</c:v>
-                </c:pt>
-                <c:pt idx="4">
-                  <c:v>Unique Files</c:v>
-                </c:pt>
-                <c:pt idx="5">
-                  <c:v>Null Files</c:v>
-                </c:pt>
-              </c:strCache>
-            </c:strRef>
           </c:cat>
           <c:val>
             <c:numRef>
-              <c:f>Sheet1!$B$2:$B$7</c:f>
+              <c:f>Sheet1!$B$2:$B$6</c:f>
               <c:numCache>
                 <c:formatCode>General</c:formatCode>
-                <c:ptCount val="6"/>
+                <c:ptCount val="5"/>
                 <c:pt idx="0">
-                  <c:v>603260</c:v>
+                  <c:v>18951</c:v>
                 </c:pt>
                 <c:pt idx="1">
-                  <c:v>603253</c:v>
+                  <c:v>4071</c:v>
                 </c:pt>
                 <c:pt idx="2">
-                  <c:v>525957</c:v>
+                  <c:v>563828</c:v>
                 </c:pt>
                 <c:pt idx="3">
-                  <c:v>50493</c:v>
+                  <c:v>7</c:v>
                 </c:pt>
                 <c:pt idx="4">
-                  <c:v>26810</c:v>
-                </c:pt>
-                <c:pt idx="5">
-                  <c:v>3</c:v>
-                </c:pt>
-              </c:numCache>
-            </c:numRef>
-          </c:val>
-        </c:ser>
-        <c:axId val="-2068027336"/>
-        <c:axId val="-2113994440"/>
-      </c:barChart>
-      <c:catAx>
-        <c:axId val="-2068027336"/>
-        <c:scaling>
-          <c:orientation val="minMax"/>
-        </c:scaling>
-        <c:delete val="0"/>
-        <c:axPos val="b"/>
-        <c:majorTickMark val="out"/>
-        <c:minorTickMark val="none"/>
-        <c:tickLblPos val="nextTo"/>
-        <c:crossAx val="-2113994440"/>
-        <c:crosses val="autoZero"/>
-        <c:auto val="1"/>
-        <c:lblAlgn val="ctr"/>
-        <c:lblOffset val="100"/>
-        <c:noMultiLvlLbl val="0"/>
-      </c:catAx>
-      <c:valAx>
-        <c:axId val="-2113994440"/>
-        <c:scaling/>
-        <c:delete val="0"/>
-        <c:axPos val="l"/>
-        <c:majorGridlines/>
-        <c:majorTickMark val="out"/>
-        <c:minorTickMark val="none"/>
-        <c:tickLblPos val="nextTo"/>
-        <c:crossAx val="-2068027336"/>
-        <c:crosses val="autoZero"/>
-      </c:valAx>
-    </c:plotArea>
-    <c:dispBlanksAs val="gap"/>
-  </c:chart>
-  <c:txPr>
-    <a:bodyPr/>
-    <a:lstStyle/>
-    <a:p>
-      <a:pPr>
-        <a:defRPr sz="1800"/>
-      </a:pPr>
-      <a:endParaRPr lang="en-US"/>
-    </a:p>
-  </c:txPr>
-  <c:externalData r:id="rId1">
-    <c:autoUpdate val="0"/>
-  </c:externalData>
-</c:chartSpace>
-</file>
-
-<file path=ppt/charts/chart4.xml><?xml version="1.0" encoding="utf-8"?>
-<c:chartSpace xmlns:c="http://schemas.openxmlformats.org/drawingml/2006/chart" xmlns:a="http://schemas.openxmlformats.org/drawingml/2006/main" xmlns:r="http://schemas.openxmlformats.org/officeDocument/2006/relationships">
-  <c:date1904 val="0"/>
-  <c:chart>
-    <c:autoTitleDeleted val="0"/>
-    <c:plotArea>
-      <c:barChart>
-        <c:barDir val="col"/>
-        <c:grouping val="clustered"/>
-        <c:ser>
-          <c:idx val="0"/>
-          <c:order val="0"/>
-          <c:tx>
-            <c:strRef>
-              <c:f>Sheet1!$B$1</c:f>
-              <c:strCache>
-                <c:ptCount val="1"/>
-                <c:pt idx="0">
-                  <c:v>Jobs</c:v>
-                </c:pt>
-              </c:strCache>
-            </c:strRef>
-          </c:tx>
-          <c:cat>
-            <c:strRef>
-              <c:f>Sheet1!$A$2:$A$8</c:f>
-              <c:strCache>
-                <c:ptCount val="7"/>
-                <c:pt idx="0">
-                  <c:v>ExtensionHarvester/Chrome</c:v>
-                </c:pt>
-                <c:pt idx="1">
-                  <c:v>VM</c:v>
-                </c:pt>
-                <c:pt idx="2">
-                  <c:v>Harvester/Linux-Harvester</c:v>
-                </c:pt>
-                <c:pt idx="3">
-                  <c:v>Microsoft/MSCatalog</c:v>
-                </c:pt>
-                <c:pt idx="4">
-                  <c:v>Python/WhlExtractorPy</c:v>
-                </c:pt>
-                <c:pt idx="5">
-                  <c:v>API/GridAdditionAPI</c:v>
-                </c:pt>
-                <c:pt idx="6">
-                  <c:v>Sources w/ Job &lt;1000</c:v>
-                </c:pt>
-              </c:strCache>
-            </c:strRef>
-          </c:cat>
-          <c:val>
-            <c:numRef>
-              <c:f>Sheet1!$B$2:$B$8</c:f>
-              <c:numCache>
-                <c:formatCode>General</c:formatCode>
-                <c:ptCount val="7"/>
-                <c:pt idx="0">
-                  <c:v>561496</c:v>
-                </c:pt>
-                <c:pt idx="1">
-                  <c:v>10009</c:v>
-                </c:pt>
-                <c:pt idx="2">
-                  <c:v>9288</c:v>
-                </c:pt>
-                <c:pt idx="3">
-                  <c:v>4227</c:v>
-                </c:pt>
-                <c:pt idx="4">
-                  <c:v>1172</c:v>
-                </c:pt>
-                <c:pt idx="5">
-                  <c:v>1095</c:v>
-                </c:pt>
-                <c:pt idx="6">
-                  <c:v>2903</c:v>
+                  <c:v>3333</c:v>
                 </c:pt>
               </c:numCache>
             </c:numRef>
@@ -3604,22 +3239,31 @@
       <p:grpSpPr/>
       <p:sp>
         <p:nvSpPr>
-          <p:cNvPr id="2" name="Title 1"/>
-          <p:cNvSpPr>
-            <a:spLocks noGrp="1"/>
-          </p:cNvSpPr>
-          <p:nvPr>
-            <p:ph type="title"/>
-          </p:nvPr>
-        </p:nvSpPr>
-        <p:spPr/>
-        <p:txBody>
-          <a:bodyPr/>
+          <p:cNvPr id="2" name="TextBox 1"/>
+          <p:cNvSpPr txBox="1"/>
+          <p:nvPr/>
+        </p:nvSpPr>
+        <p:spPr>
+          <a:xfrm>
+            <a:off x="457200" y="731520"/>
+            <a:ext cx="8229600" cy="457200"/>
+          </a:xfrm>
+          <a:prstGeom prst="rect">
+            <a:avLst/>
+          </a:prstGeom>
+          <a:noFill/>
+        </p:spPr>
+        <p:txBody>
+          <a:bodyPr wrap="none" anchor="ctr">
+            <a:spAutoFit/>
+          </a:bodyPr>
           <a:lstStyle/>
           <a:p>
-            <a:r>
-              <a:rPr sz="2800"/>
-              <a:t>Total &amp; Cancelled Jobs</a:t>
+            <a:pPr algn="ctr">
+              <a:defRPr sz="2800"/>
+            </a:pPr>
+            <a:r>
+              <a:t>Exceptions Encountered in Jobs Processing</a:t>
             </a:r>
           </a:p>
         </p:txBody>
@@ -3634,7 +3278,7 @@
         </p:nvGraphicFramePr>
         <p:xfrm>
           <a:off x="457200" y="1371600"/>
-          <a:ext cx="8229600" cy="1280160"/>
+          <a:ext cx="8229600" cy="2651760"/>
         </p:xfrm>
         <a:graphic>
           <a:graphicData uri="http://schemas.openxmlformats.org/drawingml/2006/table">
@@ -3646,7 +3290,7 @@
                 <a:gridCol w="4114800"/>
                 <a:gridCol w="4114800"/>
               </a:tblGrid>
-              <a:tr h="426720">
+              <a:tr h="294640">
                 <a:tc>
                   <a:txBody>
                     <a:bodyPr/>
@@ -3656,7 +3300,7 @@
                         <a:defRPr sz="1800"/>
                       </a:pPr>
                       <a:r>
-                        <a:t>title</a:t>
+                        <a:t>status</a:t>
                       </a:r>
                     </a:p>
                   </a:txBody>
@@ -3678,7 +3322,7 @@
                   <a:tcPr/>
                 </a:tc>
               </a:tr>
-              <a:tr h="426720">
+              <a:tr h="294640">
                 <a:tc>
                   <a:txBody>
                     <a:bodyPr/>
@@ -3686,7 +3330,7 @@
                     <a:p>
                       <a:pPr algn="l"/>
                       <a:r>
-                        <a:t>Job Count</a:t>
+                        <a:t>EXCEPTION</a:t>
                       </a:r>
                     </a:p>
                   </a:txBody>
@@ -3699,14 +3343,14 @@
                     <a:p>
                       <a:pPr algn="ctr"/>
                       <a:r>
-                        <a:t>590189</a:t>
+                        <a:t>3</a:t>
                       </a:r>
                     </a:p>
                   </a:txBody>
                   <a:tcPr/>
                 </a:tc>
               </a:tr>
-              <a:tr h="426720">
+              <a:tr h="294640">
                 <a:tc>
                   <a:txBody>
                     <a:bodyPr/>
@@ -3714,7 +3358,7 @@
                     <a:p>
                       <a:pPr algn="l"/>
                       <a:r>
-                        <a:t>Cancelled Job Count</a:t>
+                        <a:t>TIMEOUTEXCEPTION</a:t>
                       </a:r>
                     </a:p>
                   </a:txBody>
@@ -3727,7 +3371,175 @@
                     <a:p>
                       <a:pPr algn="ctr"/>
                       <a:r>
-                        <a:t>8</a:t>
+                        <a:t>4650</a:t>
+                      </a:r>
+                    </a:p>
+                  </a:txBody>
+                  <a:tcPr/>
+                </a:tc>
+              </a:tr>
+              <a:tr h="294640">
+                <a:tc>
+                  <a:txBody>
+                    <a:bodyPr/>
+                    <a:lstStyle/>
+                    <a:p>
+                      <a:pPr algn="l"/>
+                      <a:r>
+                        <a:t>VSDTEXCEPTION</a:t>
+                      </a:r>
+                    </a:p>
+                  </a:txBody>
+                  <a:tcPr/>
+                </a:tc>
+                <a:tc>
+                  <a:txBody>
+                    <a:bodyPr/>
+                    <a:lstStyle/>
+                    <a:p>
+                      <a:pPr algn="ctr"/>
+                      <a:r>
+                        <a:t>2</a:t>
+                      </a:r>
+                    </a:p>
+                  </a:txBody>
+                  <a:tcPr/>
+                </a:tc>
+              </a:tr>
+              <a:tr h="294640">
+                <a:tc>
+                  <a:txBody>
+                    <a:bodyPr/>
+                    <a:lstStyle/>
+                    <a:p>
+                      <a:pPr algn="l"/>
+                      <a:r>
+                        <a:t>FIDEXCEPTION</a:t>
+                      </a:r>
+                    </a:p>
+                  </a:txBody>
+                  <a:tcPr/>
+                </a:tc>
+                <a:tc>
+                  <a:txBody>
+                    <a:bodyPr/>
+                    <a:lstStyle/>
+                    <a:p>
+                      <a:pPr algn="ctr"/>
+                      <a:r>
+                        <a:t>2</a:t>
+                      </a:r>
+                    </a:p>
+                  </a:txBody>
+                  <a:tcPr/>
+                </a:tc>
+              </a:tr>
+              <a:tr h="294640">
+                <a:tc>
+                  <a:txBody>
+                    <a:bodyPr/>
+                    <a:lstStyle/>
+                    <a:p>
+                      <a:pPr algn="l"/>
+                      <a:r>
+                        <a:t>FIDEXCEPTION,VSDTEXCEPTION</a:t>
+                      </a:r>
+                    </a:p>
+                  </a:txBody>
+                  <a:tcPr/>
+                </a:tc>
+                <a:tc>
+                  <a:txBody>
+                    <a:bodyPr/>
+                    <a:lstStyle/>
+                    <a:p>
+                      <a:pPr algn="ctr"/>
+                      <a:r>
+                        <a:t>1</a:t>
+                      </a:r>
+                    </a:p>
+                  </a:txBody>
+                  <a:tcPr/>
+                </a:tc>
+              </a:tr>
+              <a:tr h="294640">
+                <a:tc>
+                  <a:txBody>
+                    <a:bodyPr/>
+                    <a:lstStyle/>
+                    <a:p>
+                      <a:pPr algn="l"/>
+                      <a:r>
+                        <a:t>SENTTOLEGACY</a:t>
+                      </a:r>
+                    </a:p>
+                  </a:txBody>
+                  <a:tcPr/>
+                </a:tc>
+                <a:tc>
+                  <a:txBody>
+                    <a:bodyPr/>
+                    <a:lstStyle/>
+                    <a:p>
+                      <a:pPr algn="ctr"/>
+                      <a:r>
+                        <a:t>1</a:t>
+                      </a:r>
+                    </a:p>
+                  </a:txBody>
+                  <a:tcPr/>
+                </a:tc>
+              </a:tr>
+              <a:tr h="294640">
+                <a:tc>
+                  <a:txBody>
+                    <a:bodyPr/>
+                    <a:lstStyle/>
+                    <a:p>
+                      <a:pPr algn="l"/>
+                      <a:r>
+                        <a:t>MEEXCEPTION, PAFIEXCEPTION, VSDTEXCEPTION</a:t>
+                      </a:r>
+                    </a:p>
+                  </a:txBody>
+                  <a:tcPr/>
+                </a:tc>
+                <a:tc>
+                  <a:txBody>
+                    <a:bodyPr/>
+                    <a:lstStyle/>
+                    <a:p>
+                      <a:pPr algn="ctr"/>
+                      <a:r>
+                        <a:t>1</a:t>
+                      </a:r>
+                    </a:p>
+                  </a:txBody>
+                  <a:tcPr/>
+                </a:tc>
+              </a:tr>
+              <a:tr h="294640">
+                <a:tc>
+                  <a:txBody>
+                    <a:bodyPr/>
+                    <a:lstStyle/>
+                    <a:p>
+                      <a:pPr algn="l"/>
+                      <a:r>
+                        <a:t>DAMAGEDFILE</a:t>
+                      </a:r>
+                    </a:p>
+                  </a:txBody>
+                  <a:tcPr/>
+                </a:tc>
+                <a:tc>
+                  <a:txBody>
+                    <a:bodyPr/>
+                    <a:lstStyle/>
+                    <a:p>
+                      <a:pPr algn="ctr"/>
+                      <a:r>
+                        <a:t>1</a:t>
                       </a:r>
                     </a:p>
                   </a:txBody>
@@ -3758,41 +3570,258 @@
       <p:grpSpPr/>
       <p:sp>
         <p:nvSpPr>
-          <p:cNvPr id="2" name="Title 1"/>
-          <p:cNvSpPr>
-            <a:spLocks noGrp="1"/>
-          </p:cNvSpPr>
-          <p:nvPr>
-            <p:ph type="title"/>
-          </p:nvPr>
-        </p:nvSpPr>
-        <p:spPr/>
-        <p:txBody>
-          <a:bodyPr/>
+          <p:cNvPr id="2" name="TextBox 1"/>
+          <p:cNvSpPr txBox="1"/>
+          <p:nvPr/>
+        </p:nvSpPr>
+        <p:spPr>
+          <a:xfrm>
+            <a:off x="457200" y="731520"/>
+            <a:ext cx="8229600" cy="457200"/>
+          </a:xfrm>
+          <a:prstGeom prst="rect">
+            <a:avLst/>
+          </a:prstGeom>
+          <a:noFill/>
+        </p:spPr>
+        <p:txBody>
+          <a:bodyPr wrap="none" anchor="ctr">
+            <a:spAutoFit/>
+          </a:bodyPr>
           <a:lstStyle/>
           <a:p>
-            <a:r>
-              <a:rPr sz="2800"/>
-              <a:t>Total &amp; Cancelled Jobs</a:t>
+            <a:pPr algn="ctr">
+              <a:defRPr sz="2800"/>
+            </a:pPr>
+            <a:r>
+              <a:t>Duplicate by Hash</a:t>
             </a:r>
           </a:p>
         </p:txBody>
       </p:sp>
       <p:graphicFrame>
         <p:nvGraphicFramePr>
-          <p:cNvPr id="3" name="Chart 2"/>
+          <p:cNvPr id="3" name="Table 2"/>
           <p:cNvGraphicFramePr>
             <a:graphicFrameLocks noGrp="1"/>
           </p:cNvGraphicFramePr>
           <p:nvPr/>
         </p:nvGraphicFramePr>
         <p:xfrm>
-          <a:off x="1828800" y="1828800"/>
-          <a:ext cx="5486400" cy="3657600"/>
+          <a:off x="457200" y="1371600"/>
+          <a:ext cx="8229600" cy="2103120"/>
         </p:xfrm>
         <a:graphic>
-          <a:graphicData uri="http://schemas.openxmlformats.org/drawingml/2006/chart">
-            <c:chart xmlns:c="http://schemas.openxmlformats.org/drawingml/2006/chart" r:id="rId2"/>
+          <a:graphicData uri="http://schemas.openxmlformats.org/drawingml/2006/table">
+            <a:tbl>
+              <a:tblPr firstRow="1" bandRow="1">
+                <a:tableStyleId>{5C22544A-7EE6-4342-B048-85BDC9FD1C3A}</a:tableStyleId>
+              </a:tblPr>
+              <a:tblGrid>
+                <a:gridCol w="4114800"/>
+                <a:gridCol w="4114800"/>
+              </a:tblGrid>
+              <a:tr h="300445">
+                <a:tc>
+                  <a:txBody>
+                    <a:bodyPr/>
+                    <a:lstStyle/>
+                    <a:p>
+                      <a:pPr algn="ctr">
+                        <a:defRPr sz="1800"/>
+                      </a:pPr>
+                      <a:r>
+                        <a:t>Title</a:t>
+                      </a:r>
+                    </a:p>
+                  </a:txBody>
+                  <a:tcPr/>
+                </a:tc>
+                <a:tc>
+                  <a:txBody>
+                    <a:bodyPr/>
+                    <a:lstStyle/>
+                    <a:p>
+                      <a:pPr algn="ctr">
+                        <a:defRPr sz="1800"/>
+                      </a:pPr>
+                      <a:r>
+                        <a:t>Count</a:t>
+                      </a:r>
+                    </a:p>
+                  </a:txBody>
+                  <a:tcPr/>
+                </a:tc>
+              </a:tr>
+              <a:tr h="300445">
+                <a:tc>
+                  <a:txBody>
+                    <a:bodyPr/>
+                    <a:lstStyle/>
+                    <a:p>
+                      <a:pPr algn="l"/>
+                      <a:r>
+                        <a:t>Total Files</a:t>
+                      </a:r>
+                    </a:p>
+                  </a:txBody>
+                  <a:tcPr/>
+                </a:tc>
+                <a:tc>
+                  <a:txBody>
+                    <a:bodyPr/>
+                    <a:lstStyle/>
+                    <a:p>
+                      <a:pPr algn="ctr"/>
+                      <a:r>
+                        <a:t>603260</a:t>
+                      </a:r>
+                    </a:p>
+                  </a:txBody>
+                  <a:tcPr/>
+                </a:tc>
+              </a:tr>
+              <a:tr h="300445">
+                <a:tc>
+                  <a:txBody>
+                    <a:bodyPr/>
+                    <a:lstStyle/>
+                    <a:p>
+                      <a:pPr algn="l"/>
+                      <a:r>
+                        <a:t>Processed Files</a:t>
+                      </a:r>
+                    </a:p>
+                  </a:txBody>
+                  <a:tcPr/>
+                </a:tc>
+                <a:tc>
+                  <a:txBody>
+                    <a:bodyPr/>
+                    <a:lstStyle/>
+                    <a:p>
+                      <a:pPr algn="ctr"/>
+                      <a:r>
+                        <a:t>603254</a:t>
+                      </a:r>
+                    </a:p>
+                  </a:txBody>
+                  <a:tcPr/>
+                </a:tc>
+              </a:tr>
+              <a:tr h="300445">
+                <a:tc>
+                  <a:txBody>
+                    <a:bodyPr/>
+                    <a:lstStyle/>
+                    <a:p>
+                      <a:pPr algn="l"/>
+                      <a:r>
+                        <a:t>Deduplicated Files</a:t>
+                      </a:r>
+                    </a:p>
+                  </a:txBody>
+                  <a:tcPr/>
+                </a:tc>
+                <a:tc>
+                  <a:txBody>
+                    <a:bodyPr/>
+                    <a:lstStyle/>
+                    <a:p>
+                      <a:pPr algn="ctr"/>
+                      <a:r>
+                        <a:t>525957</a:t>
+                      </a:r>
+                    </a:p>
+                  </a:txBody>
+                  <a:tcPr/>
+                </a:tc>
+              </a:tr>
+              <a:tr h="300445">
+                <a:tc>
+                  <a:txBody>
+                    <a:bodyPr/>
+                    <a:lstStyle/>
+                    <a:p>
+                      <a:pPr algn="l"/>
+                      <a:r>
+                        <a:t>Duplicate Groups</a:t>
+                      </a:r>
+                    </a:p>
+                  </a:txBody>
+                  <a:tcPr/>
+                </a:tc>
+                <a:tc>
+                  <a:txBody>
+                    <a:bodyPr/>
+                    <a:lstStyle/>
+                    <a:p>
+                      <a:pPr algn="ctr"/>
+                      <a:r>
+                        <a:t>50493</a:t>
+                      </a:r>
+                    </a:p>
+                  </a:txBody>
+                  <a:tcPr/>
+                </a:tc>
+              </a:tr>
+              <a:tr h="300445">
+                <a:tc>
+                  <a:txBody>
+                    <a:bodyPr/>
+                    <a:lstStyle/>
+                    <a:p>
+                      <a:pPr algn="l"/>
+                      <a:r>
+                        <a:t>Unique Files</a:t>
+                      </a:r>
+                    </a:p>
+                  </a:txBody>
+                  <a:tcPr/>
+                </a:tc>
+                <a:tc>
+                  <a:txBody>
+                    <a:bodyPr/>
+                    <a:lstStyle/>
+                    <a:p>
+                      <a:pPr algn="ctr"/>
+                      <a:r>
+                        <a:t>26810</a:t>
+                      </a:r>
+                    </a:p>
+                  </a:txBody>
+                  <a:tcPr/>
+                </a:tc>
+              </a:tr>
+              <a:tr h="300450">
+                <a:tc>
+                  <a:txBody>
+                    <a:bodyPr/>
+                    <a:lstStyle/>
+                    <a:p>
+                      <a:pPr algn="l"/>
+                      <a:r>
+                        <a:t>Null Files</a:t>
+                      </a:r>
+                    </a:p>
+                  </a:txBody>
+                  <a:tcPr/>
+                </a:tc>
+                <a:tc>
+                  <a:txBody>
+                    <a:bodyPr/>
+                    <a:lstStyle/>
+                    <a:p>
+                      <a:pPr algn="ctr"/>
+                      <a:r>
+                        <a:t>3</a:t>
+                      </a:r>
+                    </a:p>
+                  </a:txBody>
+                  <a:tcPr/>
+                </a:tc>
+              </a:tr>
+            </a:tbl>
           </a:graphicData>
         </a:graphic>
       </p:graphicFrame>
@@ -3816,22 +3845,31 @@
       <p:grpSpPr/>
       <p:sp>
         <p:nvSpPr>
-          <p:cNvPr id="2" name="Title 1"/>
-          <p:cNvSpPr>
-            <a:spLocks noGrp="1"/>
-          </p:cNvSpPr>
-          <p:nvPr>
-            <p:ph type="title"/>
-          </p:nvPr>
-        </p:nvSpPr>
-        <p:spPr/>
-        <p:txBody>
-          <a:bodyPr/>
+          <p:cNvPr id="2" name="TextBox 1"/>
+          <p:cNvSpPr txBox="1"/>
+          <p:nvPr/>
+        </p:nvSpPr>
+        <p:spPr>
+          <a:xfrm>
+            <a:off x="457200" y="731520"/>
+            <a:ext cx="8229600" cy="457200"/>
+          </a:xfrm>
+          <a:prstGeom prst="rect">
+            <a:avLst/>
+          </a:prstGeom>
+          <a:noFill/>
+        </p:spPr>
+        <p:txBody>
+          <a:bodyPr wrap="none" anchor="ctr">
+            <a:spAutoFit/>
+          </a:bodyPr>
           <a:lstStyle/>
           <a:p>
-            <a:r>
-              <a:rPr sz="2800"/>
-              <a:t>Exceptions Encountered in Jobs Processing</a:t>
+            <a:pPr algn="ctr">
+              <a:defRPr sz="2800"/>
+            </a:pPr>
+            <a:r>
+              <a:t>Deduped vs Processed</a:t>
             </a:r>
           </a:p>
         </p:txBody>
@@ -3846,7 +3884,7 @@
         </p:nvGraphicFramePr>
         <p:xfrm>
           <a:off x="457200" y="1371600"/>
-          <a:ext cx="8229600" cy="2926080"/>
+          <a:ext cx="8229600" cy="1280160"/>
         </p:xfrm>
         <a:graphic>
           <a:graphicData uri="http://schemas.openxmlformats.org/drawingml/2006/table">
@@ -3858,7 +3896,7 @@
                 <a:gridCol w="4114800"/>
                 <a:gridCol w="4114800"/>
               </a:tblGrid>
-              <a:tr h="325120">
+              <a:tr h="320040">
                 <a:tc>
                   <a:txBody>
                     <a:bodyPr/>
@@ -3868,7 +3906,7 @@
                         <a:defRPr sz="1800"/>
                       </a:pPr>
                       <a:r>
-                        <a:t>status</a:t>
+                        <a:t>Duplicates</a:t>
                       </a:r>
                     </a:p>
                   </a:txBody>
@@ -3883,14 +3921,14 @@
                         <a:defRPr sz="1800"/>
                       </a:pPr>
                       <a:r>
-                        <a:t>count</a:t>
+                        <a:t>Count</a:t>
                       </a:r>
                     </a:p>
                   </a:txBody>
                   <a:tcPr/>
                 </a:tc>
               </a:tr>
-              <a:tr h="325120">
+              <a:tr h="320040">
                 <a:tc>
                   <a:txBody>
                     <a:bodyPr/>
@@ -3898,7 +3936,7 @@
                     <a:p>
                       <a:pPr algn="l"/>
                       <a:r>
-                        <a:t>VSDTEXCEPTION</a:t>
+                        <a:t>ExtensionHarvester/Chrome</a:t>
                       </a:r>
                     </a:p>
                   </a:txBody>
@@ -3911,14 +3949,14 @@
                     <a:p>
                       <a:pPr algn="ctr"/>
                       <a:r>
-                        <a:t>2</a:t>
+                        <a:t>9</a:t>
                       </a:r>
                     </a:p>
                   </a:txBody>
                   <a:tcPr/>
                 </a:tc>
               </a:tr>
-              <a:tr h="325120">
+              <a:tr h="320040">
                 <a:tc>
                   <a:txBody>
                     <a:bodyPr/>
@@ -3926,7 +3964,7 @@
                     <a:p>
                       <a:pPr algn="l"/>
                       <a:r>
-                        <a:t>TIMEOUTEXCEPTION</a:t>
+                        <a:t>TEST/GridPORTALTEST</a:t>
                       </a:r>
                     </a:p>
                   </a:txBody>
@@ -3939,14 +3977,14 @@
                     <a:p>
                       <a:pPr algn="ctr"/>
                       <a:r>
-                        <a:t>4650</a:t>
+                        <a:t>1</a:t>
                       </a:r>
                     </a:p>
                   </a:txBody>
                   <a:tcPr/>
                 </a:tc>
               </a:tr>
-              <a:tr h="325120">
+              <a:tr h="320040">
                 <a:tc>
                   <a:txBody>
                     <a:bodyPr/>
@@ -3954,7 +3992,7 @@
                     <a:p>
                       <a:pPr algn="l"/>
                       <a:r>
-                        <a:t>FIDEXCEPTION</a:t>
+                        <a:t>TOTAL</a:t>
                       </a:r>
                     </a:p>
                   </a:txBody>
@@ -3967,147 +4005,7 @@
                     <a:p>
                       <a:pPr algn="ctr"/>
                       <a:r>
-                        <a:t>2</a:t>
-                      </a:r>
-                    </a:p>
-                  </a:txBody>
-                  <a:tcPr/>
-                </a:tc>
-              </a:tr>
-              <a:tr h="325120">
-                <a:tc>
-                  <a:txBody>
-                    <a:bodyPr/>
-                    <a:lstStyle/>
-                    <a:p>
-                      <a:pPr algn="l"/>
-                      <a:r>
-                        <a:t>FIDEXCEPTION,VSDTEXCEPTION</a:t>
-                      </a:r>
-                    </a:p>
-                  </a:txBody>
-                  <a:tcPr/>
-                </a:tc>
-                <a:tc>
-                  <a:txBody>
-                    <a:bodyPr/>
-                    <a:lstStyle/>
-                    <a:p>
-                      <a:pPr algn="ctr"/>
-                      <a:r>
-                        <a:t>1</a:t>
-                      </a:r>
-                    </a:p>
-                  </a:txBody>
-                  <a:tcPr/>
-                </a:tc>
-              </a:tr>
-              <a:tr h="325120">
-                <a:tc>
-                  <a:txBody>
-                    <a:bodyPr/>
-                    <a:lstStyle/>
-                    <a:p>
-                      <a:pPr algn="l"/>
-                      <a:r>
-                        <a:t>EXCEPTION</a:t>
-                      </a:r>
-                    </a:p>
-                  </a:txBody>
-                  <a:tcPr/>
-                </a:tc>
-                <a:tc>
-                  <a:txBody>
-                    <a:bodyPr/>
-                    <a:lstStyle/>
-                    <a:p>
-                      <a:pPr algn="ctr"/>
-                      <a:r>
-                        <a:t>3</a:t>
-                      </a:r>
-                    </a:p>
-                  </a:txBody>
-                  <a:tcPr/>
-                </a:tc>
-              </a:tr>
-              <a:tr h="325120">
-                <a:tc>
-                  <a:txBody>
-                    <a:bodyPr/>
-                    <a:lstStyle/>
-                    <a:p>
-                      <a:pPr algn="l"/>
-                      <a:r>
-                        <a:t>SENTTOLEGACY</a:t>
-                      </a:r>
-                    </a:p>
-                  </a:txBody>
-                  <a:tcPr/>
-                </a:tc>
-                <a:tc>
-                  <a:txBody>
-                    <a:bodyPr/>
-                    <a:lstStyle/>
-                    <a:p>
-                      <a:pPr algn="ctr"/>
-                      <a:r>
-                        <a:t>1</a:t>
-                      </a:r>
-                    </a:p>
-                  </a:txBody>
-                  <a:tcPr/>
-                </a:tc>
-              </a:tr>
-              <a:tr h="325120">
-                <a:tc>
-                  <a:txBody>
-                    <a:bodyPr/>
-                    <a:lstStyle/>
-                    <a:p>
-                      <a:pPr algn="l"/>
-                      <a:r>
-                        <a:t>MEEXCEPTION, PAFIEXCEPTION, VSDTEXCEPTION</a:t>
-                      </a:r>
-                    </a:p>
-                  </a:txBody>
-                  <a:tcPr/>
-                </a:tc>
-                <a:tc>
-                  <a:txBody>
-                    <a:bodyPr/>
-                    <a:lstStyle/>
-                    <a:p>
-                      <a:pPr algn="ctr"/>
-                      <a:r>
-                        <a:t>1</a:t>
-                      </a:r>
-                    </a:p>
-                  </a:txBody>
-                  <a:tcPr/>
-                </a:tc>
-              </a:tr>
-              <a:tr h="325120">
-                <a:tc>
-                  <a:txBody>
-                    <a:bodyPr/>
-                    <a:lstStyle/>
-                    <a:p>
-                      <a:pPr algn="l"/>
-                      <a:r>
-                        <a:t>DAMAGEDFILE</a:t>
-                      </a:r>
-                    </a:p>
-                  </a:txBody>
-                  <a:tcPr/>
-                </a:tc>
-                <a:tc>
-                  <a:txBody>
-                    <a:bodyPr/>
-                    <a:lstStyle/>
-                    <a:p>
-                      <a:pPr algn="ctr"/>
-                      <a:r>
-                        <a:t>1</a:t>
+                        <a:t>10</a:t>
                       </a:r>
                     </a:p>
                   </a:txBody>
@@ -4138,41 +4036,370 @@
       <p:grpSpPr/>
       <p:sp>
         <p:nvSpPr>
-          <p:cNvPr id="2" name="Title 1"/>
-          <p:cNvSpPr>
-            <a:spLocks noGrp="1"/>
-          </p:cNvSpPr>
-          <p:nvPr>
-            <p:ph type="title"/>
-          </p:nvPr>
-        </p:nvSpPr>
-        <p:spPr/>
-        <p:txBody>
-          <a:bodyPr/>
+          <p:cNvPr id="2" name="TextBox 1"/>
+          <p:cNvSpPr txBox="1"/>
+          <p:nvPr/>
+        </p:nvSpPr>
+        <p:spPr>
+          <a:xfrm>
+            <a:off x="457200" y="731520"/>
+            <a:ext cx="8229600" cy="457200"/>
+          </a:xfrm>
+          <a:prstGeom prst="rect">
+            <a:avLst/>
+          </a:prstGeom>
+          <a:noFill/>
+        </p:spPr>
+        <p:txBody>
+          <a:bodyPr wrap="none" anchor="ctr">
+            <a:spAutoFit/>
+          </a:bodyPr>
           <a:lstStyle/>
           <a:p>
-            <a:r>
-              <a:rPr sz="2800"/>
-              <a:t>Exceptions Encountered in Jobs Processing</a:t>
+            <a:pPr algn="ctr">
+              <a:defRPr sz="2800"/>
+            </a:pPr>
+            <a:r>
+              <a:t>Source Category Summary</a:t>
             </a:r>
           </a:p>
         </p:txBody>
       </p:sp>
       <p:graphicFrame>
         <p:nvGraphicFramePr>
-          <p:cNvPr id="3" name="Chart 2"/>
+          <p:cNvPr id="3" name="Table 2"/>
           <p:cNvGraphicFramePr>
             <a:graphicFrameLocks noGrp="1"/>
           </p:cNvGraphicFramePr>
           <p:nvPr/>
         </p:nvGraphicFramePr>
         <p:xfrm>
-          <a:off x="1828800" y="1828800"/>
-          <a:ext cx="5486400" cy="3657600"/>
+          <a:off x="457200" y="1371600"/>
+          <a:ext cx="8229600" cy="3200400"/>
         </p:xfrm>
         <a:graphic>
-          <a:graphicData uri="http://schemas.openxmlformats.org/drawingml/2006/chart">
-            <c:chart xmlns:c="http://schemas.openxmlformats.org/drawingml/2006/chart" r:id="rId2"/>
+          <a:graphicData uri="http://schemas.openxmlformats.org/drawingml/2006/table">
+            <a:tbl>
+              <a:tblPr firstRow="1" bandRow="1">
+                <a:tableStyleId>{5C22544A-7EE6-4342-B048-85BDC9FD1C3A}</a:tableStyleId>
+              </a:tblPr>
+              <a:tblGrid>
+                <a:gridCol w="4114800"/>
+                <a:gridCol w="4114800"/>
+              </a:tblGrid>
+              <a:tr h="290945">
+                <a:tc>
+                  <a:txBody>
+                    <a:bodyPr/>
+                    <a:lstStyle/>
+                    <a:p>
+                      <a:pPr algn="ctr">
+                        <a:defRPr sz="1800"/>
+                      </a:pPr>
+                      <a:r>
+                        <a:t>SourceCategory</a:t>
+                      </a:r>
+                    </a:p>
+                  </a:txBody>
+                  <a:tcPr/>
+                </a:tc>
+                <a:tc>
+                  <a:txBody>
+                    <a:bodyPr/>
+                    <a:lstStyle/>
+                    <a:p>
+                      <a:pPr algn="ctr">
+                        <a:defRPr sz="1800"/>
+                      </a:pPr>
+                      <a:r>
+                        <a:t>Job Count</a:t>
+                      </a:r>
+                    </a:p>
+                  </a:txBody>
+                  <a:tcPr/>
+                </a:tc>
+              </a:tr>
+              <a:tr h="290945">
+                <a:tc>
+                  <a:txBody>
+                    <a:bodyPr/>
+                    <a:lstStyle/>
+                    <a:p>
+                      <a:pPr algn="l"/>
+                      <a:r>
+                        <a:t>ExtensionHarvester/Chrome</a:t>
+                      </a:r>
+                    </a:p>
+                  </a:txBody>
+                  <a:tcPr/>
+                </a:tc>
+                <a:tc>
+                  <a:txBody>
+                    <a:bodyPr/>
+                    <a:lstStyle/>
+                    <a:p>
+                      <a:pPr algn="ctr"/>
+                      <a:r>
+                        <a:t>561496</a:t>
+                      </a:r>
+                    </a:p>
+                  </a:txBody>
+                  <a:tcPr/>
+                </a:tc>
+              </a:tr>
+              <a:tr h="290945">
+                <a:tc>
+                  <a:txBody>
+                    <a:bodyPr/>
+                    <a:lstStyle/>
+                    <a:p>
+                      <a:pPr algn="l"/>
+                      <a:r>
+                        <a:t>VM</a:t>
+                      </a:r>
+                    </a:p>
+                  </a:txBody>
+                  <a:tcPr/>
+                </a:tc>
+                <a:tc>
+                  <a:txBody>
+                    <a:bodyPr/>
+                    <a:lstStyle/>
+                    <a:p>
+                      <a:pPr algn="ctr"/>
+                      <a:r>
+                        <a:t>10009</a:t>
+                      </a:r>
+                    </a:p>
+                  </a:txBody>
+                  <a:tcPr/>
+                </a:tc>
+              </a:tr>
+              <a:tr h="290945">
+                <a:tc>
+                  <a:txBody>
+                    <a:bodyPr/>
+                    <a:lstStyle/>
+                    <a:p>
+                      <a:pPr algn="l"/>
+                      <a:r>
+                        <a:t>Harvester/Linux-Harvester</a:t>
+                      </a:r>
+                    </a:p>
+                  </a:txBody>
+                  <a:tcPr/>
+                </a:tc>
+                <a:tc>
+                  <a:txBody>
+                    <a:bodyPr/>
+                    <a:lstStyle/>
+                    <a:p>
+                      <a:pPr algn="ctr"/>
+                      <a:r>
+                        <a:t>9288</a:t>
+                      </a:r>
+                    </a:p>
+                  </a:txBody>
+                  <a:tcPr/>
+                </a:tc>
+              </a:tr>
+              <a:tr h="290945">
+                <a:tc>
+                  <a:txBody>
+                    <a:bodyPr/>
+                    <a:lstStyle/>
+                    <a:p>
+                      <a:pPr algn="l"/>
+                      <a:r>
+                        <a:t>stg/testing</a:t>
+                      </a:r>
+                    </a:p>
+                  </a:txBody>
+                  <a:tcPr/>
+                </a:tc>
+                <a:tc>
+                  <a:txBody>
+                    <a:bodyPr/>
+                    <a:lstStyle/>
+                    <a:p>
+                      <a:pPr algn="ctr"/>
+                      <a:r>
+                        <a:t>7529</a:t>
+                      </a:r>
+                    </a:p>
+                  </a:txBody>
+                  <a:tcPr/>
+                </a:tc>
+              </a:tr>
+              <a:tr h="290945">
+                <a:tc>
+                  <a:txBody>
+                    <a:bodyPr/>
+                    <a:lstStyle/>
+                    <a:p>
+                      <a:pPr algn="l"/>
+                      <a:r>
+                        <a:t>Microsoft/MSCatalog</a:t>
+                      </a:r>
+                    </a:p>
+                  </a:txBody>
+                  <a:tcPr/>
+                </a:tc>
+                <a:tc>
+                  <a:txBody>
+                    <a:bodyPr/>
+                    <a:lstStyle/>
+                    <a:p>
+                      <a:pPr algn="ctr"/>
+                      <a:r>
+                        <a:t>4227</a:t>
+                      </a:r>
+                    </a:p>
+                  </a:txBody>
+                  <a:tcPr/>
+                </a:tc>
+              </a:tr>
+              <a:tr h="290945">
+                <a:tc>
+                  <a:txBody>
+                    <a:bodyPr/>
+                    <a:lstStyle/>
+                    <a:p>
+                      <a:pPr algn="l"/>
+                      <a:r>
+                        <a:t>STG-AFP-Pipeline</a:t>
+                      </a:r>
+                    </a:p>
+                  </a:txBody>
+                  <a:tcPr/>
+                </a:tc>
+                <a:tc>
+                  <a:txBody>
+                    <a:bodyPr/>
+                    <a:lstStyle/>
+                    <a:p>
+                      <a:pPr algn="ctr"/>
+                      <a:r>
+                        <a:t>4078</a:t>
+                      </a:r>
+                    </a:p>
+                  </a:txBody>
+                  <a:tcPr/>
+                </a:tc>
+              </a:tr>
+              <a:tr h="290945">
+                <a:tc>
+                  <a:txBody>
+                    <a:bodyPr/>
+                    <a:lstStyle/>
+                    <a:p>
+                      <a:pPr algn="l"/>
+                      <a:r>
+                        <a:t>STG-AC-Pipeline</a:t>
+                      </a:r>
+                    </a:p>
+                  </a:txBody>
+                  <a:tcPr/>
+                </a:tc>
+                <a:tc>
+                  <a:txBody>
+                    <a:bodyPr/>
+                    <a:lstStyle/>
+                    <a:p>
+                      <a:pPr algn="ctr"/>
+                      <a:r>
+                        <a:t>1423</a:t>
+                      </a:r>
+                    </a:p>
+                  </a:txBody>
+                  <a:tcPr/>
+                </a:tc>
+              </a:tr>
+              <a:tr h="290945">
+                <a:tc>
+                  <a:txBody>
+                    <a:bodyPr/>
+                    <a:lstStyle/>
+                    <a:p>
+                      <a:pPr algn="l"/>
+                      <a:r>
+                        <a:t>Python/WhlExtractorPy</a:t>
+                      </a:r>
+                    </a:p>
+                  </a:txBody>
+                  <a:tcPr/>
+                </a:tc>
+                <a:tc>
+                  <a:txBody>
+                    <a:bodyPr/>
+                    <a:lstStyle/>
+                    <a:p>
+                      <a:pPr algn="ctr"/>
+                      <a:r>
+                        <a:t>1172</a:t>
+                      </a:r>
+                    </a:p>
+                  </a:txBody>
+                  <a:tcPr/>
+                </a:tc>
+              </a:tr>
+              <a:tr h="290945">
+                <a:tc>
+                  <a:txBody>
+                    <a:bodyPr/>
+                    <a:lstStyle/>
+                    <a:p>
+                      <a:pPr algn="l"/>
+                      <a:r>
+                        <a:t>API/GridAdditionAPI</a:t>
+                      </a:r>
+                    </a:p>
+                  </a:txBody>
+                  <a:tcPr/>
+                </a:tc>
+                <a:tc>
+                  <a:txBody>
+                    <a:bodyPr/>
+                    <a:lstStyle/>
+                    <a:p>
+                      <a:pPr algn="ctr"/>
+                      <a:r>
+                        <a:t>1095</a:t>
+                      </a:r>
+                    </a:p>
+                  </a:txBody>
+                  <a:tcPr/>
+                </a:tc>
+              </a:tr>
+              <a:tr h="290950">
+                <a:tc>
+                  <a:txBody>
+                    <a:bodyPr/>
+                    <a:lstStyle/>
+                    <a:p>
+                      <a:pPr algn="l"/>
+                      <a:r>
+                        <a:t>Other Source Category &lt; 1000 each</a:t>
+                      </a:r>
+                    </a:p>
+                  </a:txBody>
+                  <a:tcPr/>
+                </a:tc>
+                <a:tc>
+                  <a:txBody>
+                    <a:bodyPr/>
+                    <a:lstStyle/>
+                    <a:p>
+                      <a:pPr algn="ctr"/>
+                      <a:r>
+                        <a:t>2941</a:t>
+                      </a:r>
+                    </a:p>
+                  </a:txBody>
+                  <a:tcPr/>
+                </a:tc>
+              </a:tr>
+            </a:tbl>
           </a:graphicData>
         </a:graphic>
       </p:graphicFrame>
@@ -4196,697 +4423,30 @@
       <p:grpSpPr/>
       <p:sp>
         <p:nvSpPr>
-          <p:cNvPr id="2" name="Title 1"/>
-          <p:cNvSpPr>
-            <a:spLocks noGrp="1"/>
-          </p:cNvSpPr>
-          <p:nvPr>
-            <p:ph type="title"/>
-          </p:nvPr>
-        </p:nvSpPr>
-        <p:spPr/>
-        <p:txBody>
-          <a:bodyPr/>
+          <p:cNvPr id="2" name="TextBox 1"/>
+          <p:cNvSpPr txBox="1"/>
+          <p:nvPr/>
+        </p:nvSpPr>
+        <p:spPr>
+          <a:xfrm>
+            <a:off x="457200" y="731520"/>
+            <a:ext cx="8229600" cy="457200"/>
+          </a:xfrm>
+          <a:prstGeom prst="rect">
+            <a:avLst/>
+          </a:prstGeom>
+          <a:noFill/>
+        </p:spPr>
+        <p:txBody>
+          <a:bodyPr wrap="none" anchor="ctr">
+            <a:spAutoFit/>
+          </a:bodyPr>
           <a:lstStyle/>
           <a:p>
-            <a:r>
-              <a:rPr sz="2800"/>
-              <a:t>Deduped vs Processed Files</a:t>
-            </a:r>
-          </a:p>
-        </p:txBody>
-      </p:sp>
-      <p:graphicFrame>
-        <p:nvGraphicFramePr>
-          <p:cNvPr id="3" name="Table 2"/>
-          <p:cNvGraphicFramePr>
-            <a:graphicFrameLocks noGrp="1"/>
-          </p:cNvGraphicFramePr>
-          <p:nvPr/>
-        </p:nvGraphicFramePr>
-        <p:xfrm>
-          <a:off x="457200" y="1371600"/>
-          <a:ext cx="8229600" cy="2377439"/>
-        </p:xfrm>
-        <a:graphic>
-          <a:graphicData uri="http://schemas.openxmlformats.org/drawingml/2006/table">
-            <a:tbl>
-              <a:tblPr firstRow="1" bandRow="1">
-                <a:tableStyleId>{5C22544A-7EE6-4342-B048-85BDC9FD1C3A}</a:tableStyleId>
-              </a:tblPr>
-              <a:tblGrid>
-                <a:gridCol w="4114800"/>
-                <a:gridCol w="4114800"/>
-              </a:tblGrid>
-              <a:tr h="339634">
-                <a:tc>
-                  <a:txBody>
-                    <a:bodyPr/>
-                    <a:lstStyle/>
-                    <a:p>
-                      <a:pPr algn="ctr">
-                        <a:defRPr sz="1800"/>
-                      </a:pPr>
-                      <a:r>
-                        <a:t>Title</a:t>
-                      </a:r>
-                    </a:p>
-                  </a:txBody>
-                  <a:tcPr/>
-                </a:tc>
-                <a:tc>
-                  <a:txBody>
-                    <a:bodyPr/>
-                    <a:lstStyle/>
-                    <a:p>
-                      <a:pPr algn="ctr">
-                        <a:defRPr sz="1800"/>
-                      </a:pPr>
-                      <a:r>
-                        <a:t>Count</a:t>
-                      </a:r>
-                    </a:p>
-                  </a:txBody>
-                  <a:tcPr/>
-                </a:tc>
-              </a:tr>
-              <a:tr h="339634">
-                <a:tc>
-                  <a:txBody>
-                    <a:bodyPr/>
-                    <a:lstStyle/>
-                    <a:p>
-                      <a:pPr algn="l"/>
-                      <a:r>
-                        <a:t>Total Files</a:t>
-                      </a:r>
-                    </a:p>
-                  </a:txBody>
-                  <a:tcPr/>
-                </a:tc>
-                <a:tc>
-                  <a:txBody>
-                    <a:bodyPr/>
-                    <a:lstStyle/>
-                    <a:p>
-                      <a:pPr algn="ctr"/>
-                      <a:r>
-                        <a:t>603260</a:t>
-                      </a:r>
-                    </a:p>
-                  </a:txBody>
-                  <a:tcPr/>
-                </a:tc>
-              </a:tr>
-              <a:tr h="339634">
-                <a:tc>
-                  <a:txBody>
-                    <a:bodyPr/>
-                    <a:lstStyle/>
-                    <a:p>
-                      <a:pPr algn="l"/>
-                      <a:r>
-                        <a:t>Processed Files</a:t>
-                      </a:r>
-                    </a:p>
-                  </a:txBody>
-                  <a:tcPr/>
-                </a:tc>
-                <a:tc>
-                  <a:txBody>
-                    <a:bodyPr/>
-                    <a:lstStyle/>
-                    <a:p>
-                      <a:pPr algn="ctr"/>
-                      <a:r>
-                        <a:t>603253</a:t>
-                      </a:r>
-                    </a:p>
-                  </a:txBody>
-                  <a:tcPr/>
-                </a:tc>
-              </a:tr>
-              <a:tr h="339634">
-                <a:tc>
-                  <a:txBody>
-                    <a:bodyPr/>
-                    <a:lstStyle/>
-                    <a:p>
-                      <a:pPr algn="l"/>
-                      <a:r>
-                        <a:t>Deduplicated Files</a:t>
-                      </a:r>
-                    </a:p>
-                  </a:txBody>
-                  <a:tcPr/>
-                </a:tc>
-                <a:tc>
-                  <a:txBody>
-                    <a:bodyPr/>
-                    <a:lstStyle/>
-                    <a:p>
-                      <a:pPr algn="ctr"/>
-                      <a:r>
-                        <a:t>525957</a:t>
-                      </a:r>
-                    </a:p>
-                  </a:txBody>
-                  <a:tcPr/>
-                </a:tc>
-              </a:tr>
-              <a:tr h="339634">
-                <a:tc>
-                  <a:txBody>
-                    <a:bodyPr/>
-                    <a:lstStyle/>
-                    <a:p>
-                      <a:pPr algn="l"/>
-                      <a:r>
-                        <a:t>Duplicate Groups</a:t>
-                      </a:r>
-                    </a:p>
-                  </a:txBody>
-                  <a:tcPr/>
-                </a:tc>
-                <a:tc>
-                  <a:txBody>
-                    <a:bodyPr/>
-                    <a:lstStyle/>
-                    <a:p>
-                      <a:pPr algn="ctr"/>
-                      <a:r>
-                        <a:t>50493</a:t>
-                      </a:r>
-                    </a:p>
-                  </a:txBody>
-                  <a:tcPr/>
-                </a:tc>
-              </a:tr>
-              <a:tr h="339634">
-                <a:tc>
-                  <a:txBody>
-                    <a:bodyPr/>
-                    <a:lstStyle/>
-                    <a:p>
-                      <a:pPr algn="l"/>
-                      <a:r>
-                        <a:t>Unique Files</a:t>
-                      </a:r>
-                    </a:p>
-                  </a:txBody>
-                  <a:tcPr/>
-                </a:tc>
-                <a:tc>
-                  <a:txBody>
-                    <a:bodyPr/>
-                    <a:lstStyle/>
-                    <a:p>
-                      <a:pPr algn="ctr"/>
-                      <a:r>
-                        <a:t>26810</a:t>
-                      </a:r>
-                    </a:p>
-                  </a:txBody>
-                  <a:tcPr/>
-                </a:tc>
-              </a:tr>
-              <a:tr h="339635">
-                <a:tc>
-                  <a:txBody>
-                    <a:bodyPr/>
-                    <a:lstStyle/>
-                    <a:p>
-                      <a:pPr algn="l"/>
-                      <a:r>
-                        <a:t>Null Files</a:t>
-                      </a:r>
-                    </a:p>
-                  </a:txBody>
-                  <a:tcPr/>
-                </a:tc>
-                <a:tc>
-                  <a:txBody>
-                    <a:bodyPr/>
-                    <a:lstStyle/>
-                    <a:p>
-                      <a:pPr algn="ctr"/>
-                      <a:r>
-                        <a:t>3</a:t>
-                      </a:r>
-                    </a:p>
-                  </a:txBody>
-                  <a:tcPr/>
-                </a:tc>
-              </a:tr>
-            </a:tbl>
-          </a:graphicData>
-        </a:graphic>
-      </p:graphicFrame>
-    </p:spTree>
-  </p:cSld>
-  <p:clrMapOvr>
-    <a:masterClrMapping/>
-  </p:clrMapOvr>
-</p:sld>
-</file>
-
-<file path=ppt/slides/slide6.xml><?xml version="1.0" encoding="utf-8"?>
-<p:sld xmlns:a="http://schemas.openxmlformats.org/drawingml/2006/main" xmlns:p="http://schemas.openxmlformats.org/presentationml/2006/main" xmlns:r="http://schemas.openxmlformats.org/officeDocument/2006/relationships">
-  <p:cSld>
-    <p:spTree>
-      <p:nvGrpSpPr>
-        <p:cNvPr id="1" name=""/>
-        <p:cNvGrpSpPr/>
-        <p:nvPr/>
-      </p:nvGrpSpPr>
-      <p:grpSpPr/>
-      <p:sp>
-        <p:nvSpPr>
-          <p:cNvPr id="2" name="Title 1"/>
-          <p:cNvSpPr>
-            <a:spLocks noGrp="1"/>
-          </p:cNvSpPr>
-          <p:nvPr>
-            <p:ph type="title"/>
-          </p:nvPr>
-        </p:nvSpPr>
-        <p:spPr/>
-        <p:txBody>
-          <a:bodyPr/>
-          <a:lstStyle/>
-          <a:p>
-            <a:r>
-              <a:rPr sz="2800"/>
-              <a:t>Deduped vs Processed Files</a:t>
-            </a:r>
-          </a:p>
-        </p:txBody>
-      </p:sp>
-      <p:graphicFrame>
-        <p:nvGraphicFramePr>
-          <p:cNvPr id="3" name="Chart 2"/>
-          <p:cNvGraphicFramePr>
-            <a:graphicFrameLocks noGrp="1"/>
-          </p:cNvGraphicFramePr>
-          <p:nvPr/>
-        </p:nvGraphicFramePr>
-        <p:xfrm>
-          <a:off x="1828800" y="1828800"/>
-          <a:ext cx="5486400" cy="3657600"/>
-        </p:xfrm>
-        <a:graphic>
-          <a:graphicData uri="http://schemas.openxmlformats.org/drawingml/2006/chart">
-            <c:chart xmlns:c="http://schemas.openxmlformats.org/drawingml/2006/chart" r:id="rId2"/>
-          </a:graphicData>
-        </a:graphic>
-      </p:graphicFrame>
-    </p:spTree>
-  </p:cSld>
-  <p:clrMapOvr>
-    <a:masterClrMapping/>
-  </p:clrMapOvr>
-</p:sld>
-</file>
-
-<file path=ppt/slides/slide7.xml><?xml version="1.0" encoding="utf-8"?>
-<p:sld xmlns:a="http://schemas.openxmlformats.org/drawingml/2006/main" xmlns:p="http://schemas.openxmlformats.org/presentationml/2006/main" xmlns:r="http://schemas.openxmlformats.org/officeDocument/2006/relationships">
-  <p:cSld>
-    <p:spTree>
-      <p:nvGrpSpPr>
-        <p:cNvPr id="1" name=""/>
-        <p:cNvGrpSpPr/>
-        <p:nvPr/>
-      </p:nvGrpSpPr>
-      <p:grpSpPr/>
-      <p:sp>
-        <p:nvSpPr>
-          <p:cNvPr id="2" name="Title 1"/>
-          <p:cNvSpPr>
-            <a:spLocks noGrp="1"/>
-          </p:cNvSpPr>
-          <p:nvPr>
-            <p:ph type="title"/>
-          </p:nvPr>
-        </p:nvSpPr>
-        <p:spPr/>
-        <p:txBody>
-          <a:bodyPr/>
-          <a:lstStyle/>
-          <a:p>
-            <a:r>
-              <a:rPr sz="2800"/>
-              <a:t>Jobs per Source Category</a:t>
-            </a:r>
-          </a:p>
-        </p:txBody>
-      </p:sp>
-      <p:graphicFrame>
-        <p:nvGraphicFramePr>
-          <p:cNvPr id="3" name="Table 2"/>
-          <p:cNvGraphicFramePr>
-            <a:graphicFrameLocks noGrp="1"/>
-          </p:cNvGraphicFramePr>
-          <p:nvPr/>
-        </p:nvGraphicFramePr>
-        <p:xfrm>
-          <a:off x="457200" y="1371600"/>
-          <a:ext cx="8229600" cy="2651760"/>
-        </p:xfrm>
-        <a:graphic>
-          <a:graphicData uri="http://schemas.openxmlformats.org/drawingml/2006/table">
-            <a:tbl>
-              <a:tblPr firstRow="1" bandRow="1">
-                <a:tableStyleId>{5C22544A-7EE6-4342-B048-85BDC9FD1C3A}</a:tableStyleId>
-              </a:tblPr>
-              <a:tblGrid>
-                <a:gridCol w="4114800"/>
-                <a:gridCol w="4114800"/>
-              </a:tblGrid>
-              <a:tr h="331470">
-                <a:tc>
-                  <a:txBody>
-                    <a:bodyPr/>
-                    <a:lstStyle/>
-                    <a:p>
-                      <a:pPr algn="ctr">
-                        <a:defRPr sz="1800"/>
-                      </a:pPr>
-                      <a:r>
-                        <a:t>Sources</a:t>
-                      </a:r>
-                    </a:p>
-                  </a:txBody>
-                  <a:tcPr/>
-                </a:tc>
-                <a:tc>
-                  <a:txBody>
-                    <a:bodyPr/>
-                    <a:lstStyle/>
-                    <a:p>
-                      <a:pPr algn="ctr">
-                        <a:defRPr sz="1800"/>
-                      </a:pPr>
-                      <a:r>
-                        <a:t>Jobs</a:t>
-                      </a:r>
-                    </a:p>
-                  </a:txBody>
-                  <a:tcPr/>
-                </a:tc>
-              </a:tr>
-              <a:tr h="331470">
-                <a:tc>
-                  <a:txBody>
-                    <a:bodyPr/>
-                    <a:lstStyle/>
-                    <a:p>
-                      <a:pPr algn="l"/>
-                      <a:r>
-                        <a:t>ExtensionHarvester/Chrome</a:t>
-                      </a:r>
-                    </a:p>
-                  </a:txBody>
-                  <a:tcPr/>
-                </a:tc>
-                <a:tc>
-                  <a:txBody>
-                    <a:bodyPr/>
-                    <a:lstStyle/>
-                    <a:p>
-                      <a:pPr algn="ctr"/>
-                      <a:r>
-                        <a:t>561496</a:t>
-                      </a:r>
-                    </a:p>
-                  </a:txBody>
-                  <a:tcPr/>
-                </a:tc>
-              </a:tr>
-              <a:tr h="331470">
-                <a:tc>
-                  <a:txBody>
-                    <a:bodyPr/>
-                    <a:lstStyle/>
-                    <a:p>
-                      <a:pPr algn="l"/>
-                      <a:r>
-                        <a:t>VM</a:t>
-                      </a:r>
-                    </a:p>
-                  </a:txBody>
-                  <a:tcPr/>
-                </a:tc>
-                <a:tc>
-                  <a:txBody>
-                    <a:bodyPr/>
-                    <a:lstStyle/>
-                    <a:p>
-                      <a:pPr algn="ctr"/>
-                      <a:r>
-                        <a:t>10009</a:t>
-                      </a:r>
-                    </a:p>
-                  </a:txBody>
-                  <a:tcPr/>
-                </a:tc>
-              </a:tr>
-              <a:tr h="331470">
-                <a:tc>
-                  <a:txBody>
-                    <a:bodyPr/>
-                    <a:lstStyle/>
-                    <a:p>
-                      <a:pPr algn="l"/>
-                      <a:r>
-                        <a:t>Harvester/Linux-Harvester</a:t>
-                      </a:r>
-                    </a:p>
-                  </a:txBody>
-                  <a:tcPr/>
-                </a:tc>
-                <a:tc>
-                  <a:txBody>
-                    <a:bodyPr/>
-                    <a:lstStyle/>
-                    <a:p>
-                      <a:pPr algn="ctr"/>
-                      <a:r>
-                        <a:t>9288</a:t>
-                      </a:r>
-                    </a:p>
-                  </a:txBody>
-                  <a:tcPr/>
-                </a:tc>
-              </a:tr>
-              <a:tr h="331470">
-                <a:tc>
-                  <a:txBody>
-                    <a:bodyPr/>
-                    <a:lstStyle/>
-                    <a:p>
-                      <a:pPr algn="l"/>
-                      <a:r>
-                        <a:t>Microsoft/MSCatalog</a:t>
-                      </a:r>
-                    </a:p>
-                  </a:txBody>
-                  <a:tcPr/>
-                </a:tc>
-                <a:tc>
-                  <a:txBody>
-                    <a:bodyPr/>
-                    <a:lstStyle/>
-                    <a:p>
-                      <a:pPr algn="ctr"/>
-                      <a:r>
-                        <a:t>4227</a:t>
-                      </a:r>
-                    </a:p>
-                  </a:txBody>
-                  <a:tcPr/>
-                </a:tc>
-              </a:tr>
-              <a:tr h="331470">
-                <a:tc>
-                  <a:txBody>
-                    <a:bodyPr/>
-                    <a:lstStyle/>
-                    <a:p>
-                      <a:pPr algn="l"/>
-                      <a:r>
-                        <a:t>Python/WhlExtractorPy</a:t>
-                      </a:r>
-                    </a:p>
-                  </a:txBody>
-                  <a:tcPr/>
-                </a:tc>
-                <a:tc>
-                  <a:txBody>
-                    <a:bodyPr/>
-                    <a:lstStyle/>
-                    <a:p>
-                      <a:pPr algn="ctr"/>
-                      <a:r>
-                        <a:t>1172</a:t>
-                      </a:r>
-                    </a:p>
-                  </a:txBody>
-                  <a:tcPr/>
-                </a:tc>
-              </a:tr>
-              <a:tr h="331470">
-                <a:tc>
-                  <a:txBody>
-                    <a:bodyPr/>
-                    <a:lstStyle/>
-                    <a:p>
-                      <a:pPr algn="l"/>
-                      <a:r>
-                        <a:t>API/GridAdditionAPI</a:t>
-                      </a:r>
-                    </a:p>
-                  </a:txBody>
-                  <a:tcPr/>
-                </a:tc>
-                <a:tc>
-                  <a:txBody>
-                    <a:bodyPr/>
-                    <a:lstStyle/>
-                    <a:p>
-                      <a:pPr algn="ctr"/>
-                      <a:r>
-                        <a:t>1095</a:t>
-                      </a:r>
-                    </a:p>
-                  </a:txBody>
-                  <a:tcPr/>
-                </a:tc>
-              </a:tr>
-              <a:tr h="331470">
-                <a:tc>
-                  <a:txBody>
-                    <a:bodyPr/>
-                    <a:lstStyle/>
-                    <a:p>
-                      <a:pPr algn="l"/>
-                      <a:r>
-                        <a:t>Sources w/ Job &lt;1000</a:t>
-                      </a:r>
-                    </a:p>
-                  </a:txBody>
-                  <a:tcPr/>
-                </a:tc>
-                <a:tc>
-                  <a:txBody>
-                    <a:bodyPr/>
-                    <a:lstStyle/>
-                    <a:p>
-                      <a:pPr algn="ctr"/>
-                      <a:r>
-                        <a:t>2903</a:t>
-                      </a:r>
-                    </a:p>
-                  </a:txBody>
-                  <a:tcPr/>
-                </a:tc>
-              </a:tr>
-            </a:tbl>
-          </a:graphicData>
-        </a:graphic>
-      </p:graphicFrame>
-    </p:spTree>
-  </p:cSld>
-  <p:clrMapOvr>
-    <a:masterClrMapping/>
-  </p:clrMapOvr>
-</p:sld>
-</file>
-
-<file path=ppt/slides/slide8.xml><?xml version="1.0" encoding="utf-8"?>
-<p:sld xmlns:a="http://schemas.openxmlformats.org/drawingml/2006/main" xmlns:p="http://schemas.openxmlformats.org/presentationml/2006/main" xmlns:r="http://schemas.openxmlformats.org/officeDocument/2006/relationships">
-  <p:cSld>
-    <p:spTree>
-      <p:nvGrpSpPr>
-        <p:cNvPr id="1" name=""/>
-        <p:cNvGrpSpPr/>
-        <p:nvPr/>
-      </p:nvGrpSpPr>
-      <p:grpSpPr/>
-      <p:sp>
-        <p:nvSpPr>
-          <p:cNvPr id="2" name="Title 1"/>
-          <p:cNvSpPr>
-            <a:spLocks noGrp="1"/>
-          </p:cNvSpPr>
-          <p:nvPr>
-            <p:ph type="title"/>
-          </p:nvPr>
-        </p:nvSpPr>
-        <p:spPr/>
-        <p:txBody>
-          <a:bodyPr/>
-          <a:lstStyle/>
-          <a:p>
-            <a:r>
-              <a:rPr sz="2800"/>
-              <a:t>Jobs per Source Category</a:t>
-            </a:r>
-          </a:p>
-        </p:txBody>
-      </p:sp>
-      <p:graphicFrame>
-        <p:nvGraphicFramePr>
-          <p:cNvPr id="3" name="Chart 2"/>
-          <p:cNvGraphicFramePr>
-            <a:graphicFrameLocks noGrp="1"/>
-          </p:cNvGraphicFramePr>
-          <p:nvPr/>
-        </p:nvGraphicFramePr>
-        <p:xfrm>
-          <a:off x="1828800" y="1828800"/>
-          <a:ext cx="5486400" cy="3657600"/>
-        </p:xfrm>
-        <a:graphic>
-          <a:graphicData uri="http://schemas.openxmlformats.org/drawingml/2006/chart">
-            <c:chart xmlns:c="http://schemas.openxmlformats.org/drawingml/2006/chart" r:id="rId2"/>
-          </a:graphicData>
-        </a:graphic>
-      </p:graphicFrame>
-    </p:spTree>
-  </p:cSld>
-  <p:clrMapOvr>
-    <a:masterClrMapping/>
-  </p:clrMapOvr>
-</p:sld>
-</file>
-
-<file path=ppt/slides/slide9.xml><?xml version="1.0" encoding="utf-8"?>
-<p:sld xmlns:a="http://schemas.openxmlformats.org/drawingml/2006/main" xmlns:p="http://schemas.openxmlformats.org/presentationml/2006/main" xmlns:r="http://schemas.openxmlformats.org/officeDocument/2006/relationships">
-  <p:cSld>
-    <p:spTree>
-      <p:nvGrpSpPr>
-        <p:cNvPr id="1" name=""/>
-        <p:cNvGrpSpPr/>
-        <p:nvPr/>
-      </p:nvGrpSpPr>
-      <p:grpSpPr/>
-      <p:sp>
-        <p:nvSpPr>
-          <p:cNvPr id="2" name="Title 1"/>
-          <p:cNvSpPr>
-            <a:spLocks noGrp="1"/>
-          </p:cNvSpPr>
-          <p:nvPr>
-            <p:ph type="title"/>
-          </p:nvPr>
-        </p:nvSpPr>
-        <p:spPr/>
-        <p:txBody>
-          <a:bodyPr/>
-          <a:lstStyle/>
-          <a:p>
-            <a:r>
-              <a:rPr sz="2800"/>
+            <a:pPr algn="ctr">
+              <a:defRPr sz="2800"/>
+            </a:pPr>
+            <a:r>
               <a:t>Jobs by Priority</a:t>
             </a:r>
           </a:p>
@@ -4996,7 +4556,7 @@
                     <a:p>
                       <a:pPr algn="l"/>
                       <a:r>
-                        <a:t>18951</a:t>
+                        <a:t>18,951</a:t>
                       </a:r>
                     </a:p>
                   </a:txBody>
@@ -5037,7 +4597,7 @@
                     <a:p>
                       <a:pPr algn="l"/>
                       <a:r>
-                        <a:t>4071</a:t>
+                        <a:t>4,071</a:t>
                       </a:r>
                     </a:p>
                   </a:txBody>
@@ -5078,7 +4638,7 @@
                     <a:p>
                       <a:pPr algn="l"/>
                       <a:r>
-                        <a:t>563828</a:t>
+                        <a:t>563,828</a:t>
                       </a:r>
                     </a:p>
                   </a:txBody>
@@ -5160,7 +4720,7 @@
                     <a:p>
                       <a:pPr algn="l"/>
                       <a:r>
-                        <a:t>3333</a:t>
+                        <a:t>3,333</a:t>
                       </a:r>
                     </a:p>
                   </a:txBody>
@@ -5168,6 +4728,148 @@
                 </a:tc>
               </a:tr>
             </a:tbl>
+          </a:graphicData>
+        </a:graphic>
+      </p:graphicFrame>
+      <p:sp>
+        <p:nvSpPr>
+          <p:cNvPr id="4" name="Rounded Rectangle 3"/>
+          <p:cNvSpPr/>
+          <p:nvPr/>
+        </p:nvSpPr>
+        <p:spPr>
+          <a:xfrm>
+            <a:off x="457200" y="3749040"/>
+            <a:ext cx="3657600" cy="1828800"/>
+          </a:xfrm>
+          <a:prstGeom prst="roundRect">
+            <a:avLst/>
+          </a:prstGeom>
+          <a:solidFill>
+            <a:srgbClr val="CCFFCC"/>
+          </a:solidFill>
+          <a:ln>
+            <a:solidFill>
+              <a:srgbClr val="006400"/>
+            </a:solidFill>
+          </a:ln>
+        </p:spPr>
+        <p:style>
+          <a:lnRef idx="1">
+            <a:schemeClr val="accent1"/>
+          </a:lnRef>
+          <a:fillRef idx="3">
+            <a:schemeClr val="accent1"/>
+          </a:fillRef>
+          <a:effectRef idx="2">
+            <a:schemeClr val="accent1"/>
+          </a:effectRef>
+          <a:fontRef idx="minor">
+            <a:schemeClr val="lt1"/>
+          </a:fontRef>
+        </p:style>
+        <p:txBody>
+          <a:bodyPr rtlCol="0" anchor="ctr" tIns="0"/>
+          <a:lstStyle/>
+          <a:p>
+            <a:pPr algn="l">
+              <a:defRPr sz="1400">
+                <a:solidFill>
+                  <a:srgbClr val="000000"/>
+                </a:solidFill>
+                <a:latin typeface="Arial"/>
+              </a:defRPr>
+            </a:pPr>
+            <a:r>
+              <a:t>Job SLA Status</a:t>
+            </a:r>
+            <a:br/>
+            <a:r>
+              <a:t>Total Done Jobs: 595</a:t>
+            </a:r>
+            <a:br/>
+            <a:r>
+              <a:t>(includes duplicate hash jobs)</a:t>
+            </a:r>
+            <a:br/>
+            <a:r>
+              <a:t>Jobs Done Within SLA: 587</a:t>
+            </a:r>
+            <a:br/>
+            <a:r>
+              <a:t>Jobs Done Outside SLA: 8</a:t>
+            </a:r>
+            <a:br/>
+            <a:r>
+              <a:t>Overall SLA Compliance: 98.66%</a:t>
+            </a:r>
+          </a:p>
+        </p:txBody>
+      </p:sp>
+    </p:spTree>
+  </p:cSld>
+  <p:clrMapOvr>
+    <a:masterClrMapping/>
+  </p:clrMapOvr>
+</p:sld>
+</file>
+
+<file path=ppt/slides/slide6.xml><?xml version="1.0" encoding="utf-8"?>
+<p:sld xmlns:a="http://schemas.openxmlformats.org/drawingml/2006/main" xmlns:p="http://schemas.openxmlformats.org/presentationml/2006/main" xmlns:r="http://schemas.openxmlformats.org/officeDocument/2006/relationships">
+  <p:cSld>
+    <p:spTree>
+      <p:nvGrpSpPr>
+        <p:cNvPr id="1" name=""/>
+        <p:cNvGrpSpPr/>
+        <p:nvPr/>
+      </p:nvGrpSpPr>
+      <p:grpSpPr/>
+      <p:sp>
+        <p:nvSpPr>
+          <p:cNvPr id="2" name="TextBox 1"/>
+          <p:cNvSpPr txBox="1"/>
+          <p:nvPr/>
+        </p:nvSpPr>
+        <p:spPr>
+          <a:xfrm>
+            <a:off x="457200" y="731520"/>
+            <a:ext cx="8229600" cy="457200"/>
+          </a:xfrm>
+          <a:prstGeom prst="rect">
+            <a:avLst/>
+          </a:prstGeom>
+          <a:noFill/>
+        </p:spPr>
+        <p:txBody>
+          <a:bodyPr wrap="none" anchor="ctr">
+            <a:spAutoFit/>
+          </a:bodyPr>
+          <a:lstStyle/>
+          <a:p>
+            <a:pPr algn="ctr">
+              <a:defRPr sz="2800"/>
+            </a:pPr>
+            <a:r>
+              <a:t>Jobs by Priority</a:t>
+            </a:r>
+          </a:p>
+        </p:txBody>
+      </p:sp>
+      <p:graphicFrame>
+        <p:nvGraphicFramePr>
+          <p:cNvPr id="3" name="Chart 2"/>
+          <p:cNvGraphicFramePr>
+            <a:graphicFrameLocks noGrp="1"/>
+          </p:cNvGraphicFramePr>
+          <p:nvPr/>
+        </p:nvGraphicFramePr>
+        <p:xfrm>
+          <a:off x="914400" y="914400"/>
+          <a:ext cx="7315200" cy="5486400"/>
+        </p:xfrm>
+        <a:graphic>
+          <a:graphicData uri="http://schemas.openxmlformats.org/drawingml/2006/chart">
+            <c:chart xmlns:c="http://schemas.openxmlformats.org/drawingml/2006/chart" r:id="rId2"/>
           </a:graphicData>
         </a:graphic>
       </p:graphicFrame>

</xml_diff>

<commit_message>
Summary Text Box Update
</commit_message>
<xml_diff>
--- a/status_report.pptx
+++ b/status_report.pptx
@@ -11,6 +11,8 @@
     <p:sldId id="259" r:id="rId10"/>
     <p:sldId id="260" r:id="rId11"/>
     <p:sldId id="261" r:id="rId12"/>
+    <p:sldId id="262" r:id="rId13"/>
+    <p:sldId id="263" r:id="rId14"/>
   </p:sldIdLst>
   <p:sldSz cx="9144000" cy="6858000" type="screen4x3"/>
   <p:notesSz cx="6858000" cy="9144000"/>
@@ -238,6 +240,293 @@
         <c:crosses val="autoZero"/>
       </c:valAx>
     </c:plotArea>
+    <c:dispBlanksAs val="gap"/>
+  </c:chart>
+  <c:txPr>
+    <a:bodyPr/>
+    <a:lstStyle/>
+    <a:p>
+      <a:pPr>
+        <a:defRPr sz="1800"/>
+      </a:pPr>
+      <a:endParaRPr lang="en-US"/>
+    </a:p>
+  </c:txPr>
+  <c:externalData r:id="rId1">
+    <c:autoUpdate val="0"/>
+  </c:externalData>
+</c:chartSpace>
+</file>
+
+<file path=ppt/charts/chart2.xml><?xml version="1.0" encoding="utf-8"?>
+<c:chartSpace xmlns:c="http://schemas.openxmlformats.org/drawingml/2006/chart" xmlns:a="http://schemas.openxmlformats.org/drawingml/2006/main" xmlns:r="http://schemas.openxmlformats.org/officeDocument/2006/relationships">
+  <c:date1904 val="0"/>
+  <c:chart>
+    <c:autoTitleDeleted val="0"/>
+    <c:plotArea>
+      <c:barChart>
+        <c:barDir val="col"/>
+        <c:grouping val="clustered"/>
+        <c:ser>
+          <c:idx val="0"/>
+          <c:order val="0"/>
+          <c:tx>
+            <c:strRef>
+              <c:f>Sheet1!$B$1</c:f>
+              <c:strCache>
+                <c:ptCount val="1"/>
+                <c:pt idx="0">
+                  <c:v>CANCELLED</c:v>
+                </c:pt>
+              </c:strCache>
+            </c:strRef>
+          </c:tx>
+          <c:spPr>
+            <a:solidFill>
+              <a:srgbClr val="F56924"/>
+            </a:solidFill>
+          </c:spPr>
+          <c:dLbls>
+            <c:numFmt formatCode="#,##0" sourceLinked="0"/>
+            <c:txPr>
+              <a:bodyPr/>
+              <a:lstStyle/>
+              <a:p>
+                <a:pPr>
+                  <a:defRPr sz="1200">
+                    <a:latin typeface="Arial"/>
+                  </a:defRPr>
+                </a:pPr>
+              </a:p>
+            </c:txPr>
+            <c:showLegendKey val="0"/>
+            <c:showVal val="1"/>
+            <c:showCatName val="0"/>
+            <c:showSerName val="0"/>
+            <c:showPercent val="0"/>
+            <c:showBubbleSize val="0"/>
+            <c:showLeaderLines val="1"/>
+          </c:dLbls>
+          <c:cat>
+            <c:strRef>
+              <c:f>Sheet1!$A$2:$A$9</c:f>
+              <c:strCache>
+                <c:ptCount val="8"/>
+                <c:pt idx="0">
+                  <c:v>Jul 12 - Jul 19</c:v>
+                </c:pt>
+                <c:pt idx="1">
+                  <c:v>Jul 5 - Jul 12</c:v>
+                </c:pt>
+                <c:pt idx="2">
+                  <c:v>Jun 28 - Jul 5</c:v>
+                </c:pt>
+                <c:pt idx="3">
+                  <c:v>Jun 21 - Jun 28</c:v>
+                </c:pt>
+                <c:pt idx="4">
+                  <c:v>Jun 14 - Jun 21</c:v>
+                </c:pt>
+                <c:pt idx="5">
+                  <c:v>Jun 7 - Jun 14</c:v>
+                </c:pt>
+                <c:pt idx="6">
+                  <c:v>May 31 - Jun 7</c:v>
+                </c:pt>
+                <c:pt idx="7">
+                  <c:v>May 24 - May 31</c:v>
+                </c:pt>
+              </c:strCache>
+            </c:strRef>
+          </c:cat>
+          <c:val>
+            <c:numRef>
+              <c:f>Sheet1!$B$2:$B$9</c:f>
+              <c:numCache>
+                <c:formatCode>General</c:formatCode>
+                <c:ptCount val="8"/>
+                <c:pt idx="0">
+                  <c:v>0</c:v>
+                </c:pt>
+                <c:pt idx="1">
+                  <c:v>0</c:v>
+                </c:pt>
+                <c:pt idx="2">
+                  <c:v>0</c:v>
+                </c:pt>
+                <c:pt idx="3">
+                  <c:v>0</c:v>
+                </c:pt>
+                <c:pt idx="4">
+                  <c:v>0</c:v>
+                </c:pt>
+                <c:pt idx="5">
+                  <c:v>0</c:v>
+                </c:pt>
+                <c:pt idx="6">
+                  <c:v>0</c:v>
+                </c:pt>
+                <c:pt idx="7">
+                  <c:v>0</c:v>
+                </c:pt>
+              </c:numCache>
+            </c:numRef>
+          </c:val>
+        </c:ser>
+        <c:ser>
+          <c:idx val="1"/>
+          <c:order val="1"/>
+          <c:tx>
+            <c:strRef>
+              <c:f>Sheet1!$C$1</c:f>
+              <c:strCache>
+                <c:ptCount val="1"/>
+                <c:pt idx="0">
+                  <c:v>TOTAL</c:v>
+                </c:pt>
+              </c:strCache>
+            </c:strRef>
+          </c:tx>
+          <c:spPr>
+            <a:solidFill>
+              <a:srgbClr val="004263"/>
+            </a:solidFill>
+          </c:spPr>
+          <c:dLbls>
+            <c:numFmt formatCode="#,##0" sourceLinked="0"/>
+            <c:txPr>
+              <a:bodyPr/>
+              <a:lstStyle/>
+              <a:p>
+                <a:pPr>
+                  <a:defRPr sz="1200">
+                    <a:latin typeface="Arial"/>
+                  </a:defRPr>
+                </a:pPr>
+              </a:p>
+            </c:txPr>
+            <c:showLegendKey val="0"/>
+            <c:showVal val="1"/>
+            <c:showCatName val="0"/>
+            <c:showSerName val="0"/>
+            <c:showPercent val="0"/>
+            <c:showBubbleSize val="0"/>
+            <c:showLeaderLines val="1"/>
+          </c:dLbls>
+          <c:cat>
+            <c:strRef>
+              <c:f>Sheet1!$A$2:$A$9</c:f>
+              <c:strCache>
+                <c:ptCount val="8"/>
+                <c:pt idx="0">
+                  <c:v>Jul 12 - Jul 19</c:v>
+                </c:pt>
+                <c:pt idx="1">
+                  <c:v>Jul 5 - Jul 12</c:v>
+                </c:pt>
+                <c:pt idx="2">
+                  <c:v>Jun 28 - Jul 5</c:v>
+                </c:pt>
+                <c:pt idx="3">
+                  <c:v>Jun 21 - Jun 28</c:v>
+                </c:pt>
+                <c:pt idx="4">
+                  <c:v>Jun 14 - Jun 21</c:v>
+                </c:pt>
+                <c:pt idx="5">
+                  <c:v>Jun 7 - Jun 14</c:v>
+                </c:pt>
+                <c:pt idx="6">
+                  <c:v>May 31 - Jun 7</c:v>
+                </c:pt>
+                <c:pt idx="7">
+                  <c:v>May 24 - May 31</c:v>
+                </c:pt>
+              </c:strCache>
+            </c:strRef>
+          </c:cat>
+          <c:val>
+            <c:numRef>
+              <c:f>Sheet1!$C$2:$C$9</c:f>
+              <c:numCache>
+                <c:formatCode>General</c:formatCode>
+                <c:ptCount val="8"/>
+                <c:pt idx="0">
+                  <c:v>0</c:v>
+                </c:pt>
+                <c:pt idx="1">
+                  <c:v>7</c:v>
+                </c:pt>
+                <c:pt idx="2">
+                  <c:v>9856</c:v>
+                </c:pt>
+                <c:pt idx="3">
+                  <c:v>27</c:v>
+                </c:pt>
+                <c:pt idx="4">
+                  <c:v>761</c:v>
+                </c:pt>
+                <c:pt idx="5">
+                  <c:v>56527</c:v>
+                </c:pt>
+                <c:pt idx="6">
+                  <c:v>8489</c:v>
+                </c:pt>
+                <c:pt idx="7">
+                  <c:v>14615</c:v>
+                </c:pt>
+              </c:numCache>
+            </c:numRef>
+          </c:val>
+        </c:ser>
+        <c:axId val="-2068027336"/>
+        <c:axId val="-2113994440"/>
+      </c:barChart>
+      <c:catAx>
+        <c:axId val="-2068027336"/>
+        <c:scaling>
+          <c:orientation val="minMax"/>
+        </c:scaling>
+        <c:delete val="0"/>
+        <c:axPos val="b"/>
+        <c:majorTickMark val="out"/>
+        <c:minorTickMark val="none"/>
+        <c:tickLblPos val="nextTo"/>
+        <c:txPr>
+          <a:bodyPr/>
+          <a:lstStyle/>
+          <a:p>
+            <a:pPr>
+              <a:defRPr sz="1000">
+                <a:latin typeface="Arial"/>
+              </a:defRPr>
+            </a:pPr>
+          </a:p>
+        </c:txPr>
+        <c:crossAx val="-2113994440"/>
+        <c:crosses val="autoZero"/>
+        <c:auto val="1"/>
+        <c:lblAlgn val="ctr"/>
+        <c:lblOffset val="100"/>
+        <c:noMultiLvlLbl val="0"/>
+      </c:catAx>
+      <c:valAx>
+        <c:axId val="-2113994440"/>
+        <c:scaling/>
+        <c:delete val="0"/>
+        <c:axPos val="l"/>
+        <c:majorGridlines/>
+        <c:majorTickMark val="out"/>
+        <c:minorTickMark val="none"/>
+        <c:tickLblPos val="nextTo"/>
+        <c:crossAx val="-2068027336"/>
+        <c:crosses val="autoZero"/>
+      </c:valAx>
+    </c:plotArea>
+    <c:legend>
+      <c:legendPos val="b"/>
+      <c:overlay val="0"/>
+    </c:legend>
     <c:dispBlanksAs val="gap"/>
   </c:chart>
   <c:txPr>
@@ -3245,7 +3534,7 @@
         </p:nvSpPr>
         <p:spPr>
           <a:xfrm>
-            <a:off x="457200" y="731520"/>
+            <a:off x="457200" y="457200"/>
             <a:ext cx="8229600" cy="457200"/>
           </a:xfrm>
           <a:prstGeom prst="rect">
@@ -3277,7 +3566,7 @@
           <p:nvPr/>
         </p:nvGraphicFramePr>
         <p:xfrm>
-          <a:off x="457200" y="1371600"/>
+          <a:off x="457200" y="1097280"/>
           <a:ext cx="8229600" cy="2651760"/>
         </p:xfrm>
         <a:graphic>
@@ -3330,7 +3619,7 @@
                     <a:p>
                       <a:pPr algn="l"/>
                       <a:r>
-                        <a:t>EXCEPTION</a:t>
+                        <a:t>VSDTEXCEPTION</a:t>
                       </a:r>
                     </a:p>
                   </a:txBody>
@@ -3343,7 +3632,7 @@
                     <a:p>
                       <a:pPr algn="ctr"/>
                       <a:r>
-                        <a:t>3</a:t>
+                        <a:t>2</a:t>
                       </a:r>
                     </a:p>
                   </a:txBody>
@@ -3371,7 +3660,7 @@
                     <a:p>
                       <a:pPr algn="ctr"/>
                       <a:r>
-                        <a:t>4650</a:t>
+                        <a:t>4,650</a:t>
                       </a:r>
                     </a:p>
                   </a:txBody>
@@ -3386,7 +3675,7 @@
                     <a:p>
                       <a:pPr algn="l"/>
                       <a:r>
-                        <a:t>VSDTEXCEPTION</a:t>
+                        <a:t>FIDEXCEPTION</a:t>
                       </a:r>
                     </a:p>
                   </a:txBody>
@@ -3414,7 +3703,7 @@
                     <a:p>
                       <a:pPr algn="l"/>
                       <a:r>
-                        <a:t>FIDEXCEPTION</a:t>
+                        <a:t>FIDEXCEPTION,VSDTEXCEPTION</a:t>
                       </a:r>
                     </a:p>
                   </a:txBody>
@@ -3427,7 +3716,7 @@
                     <a:p>
                       <a:pPr algn="ctr"/>
                       <a:r>
-                        <a:t>2</a:t>
+                        <a:t>1</a:t>
                       </a:r>
                     </a:p>
                   </a:txBody>
@@ -3442,7 +3731,7 @@
                     <a:p>
                       <a:pPr algn="l"/>
                       <a:r>
-                        <a:t>FIDEXCEPTION,VSDTEXCEPTION</a:t>
+                        <a:t>EXCEPTION</a:t>
                       </a:r>
                     </a:p>
                   </a:txBody>
@@ -3455,7 +3744,7 @@
                     <a:p>
                       <a:pPr algn="ctr"/>
                       <a:r>
-                        <a:t>1</a:t>
+                        <a:t>3</a:t>
                       </a:r>
                     </a:p>
                   </a:txBody>
@@ -3576,7 +3865,7 @@
         </p:nvSpPr>
         <p:spPr>
           <a:xfrm>
-            <a:off x="457200" y="731520"/>
+            <a:off x="457200" y="457200"/>
             <a:ext cx="8229600" cy="457200"/>
           </a:xfrm>
           <a:prstGeom prst="rect">
@@ -3608,7 +3897,7 @@
           <p:nvPr/>
         </p:nvGraphicFramePr>
         <p:xfrm>
-          <a:off x="457200" y="1371600"/>
+          <a:off x="457200" y="1097280"/>
           <a:ext cx="8229600" cy="2103120"/>
         </p:xfrm>
         <a:graphic>
@@ -3674,7 +3963,7 @@
                     <a:p>
                       <a:pPr algn="ctr"/>
                       <a:r>
-                        <a:t>603260</a:t>
+                        <a:t>603,260</a:t>
                       </a:r>
                     </a:p>
                   </a:txBody>
@@ -3702,7 +3991,7 @@
                     <a:p>
                       <a:pPr algn="ctr"/>
                       <a:r>
-                        <a:t>603254</a:t>
+                        <a:t>603,253</a:t>
                       </a:r>
                     </a:p>
                   </a:txBody>
@@ -3730,7 +4019,7 @@
                     <a:p>
                       <a:pPr algn="ctr"/>
                       <a:r>
-                        <a:t>525957</a:t>
+                        <a:t>525,957</a:t>
                       </a:r>
                     </a:p>
                   </a:txBody>
@@ -3758,7 +4047,7 @@
                     <a:p>
                       <a:pPr algn="ctr"/>
                       <a:r>
-                        <a:t>50493</a:t>
+                        <a:t>50,493</a:t>
                       </a:r>
                     </a:p>
                   </a:txBody>
@@ -3786,7 +4075,7 @@
                     <a:p>
                       <a:pPr algn="ctr"/>
                       <a:r>
-                        <a:t>26810</a:t>
+                        <a:t>26,810</a:t>
                       </a:r>
                     </a:p>
                   </a:txBody>
@@ -3851,7 +4140,7 @@
         </p:nvSpPr>
         <p:spPr>
           <a:xfrm>
-            <a:off x="457200" y="731520"/>
+            <a:off x="457200" y="457200"/>
             <a:ext cx="8229600" cy="457200"/>
           </a:xfrm>
           <a:prstGeom prst="rect">
@@ -3883,8 +4172,8 @@
           <p:nvPr/>
         </p:nvGraphicFramePr>
         <p:xfrm>
-          <a:off x="457200" y="1371600"/>
-          <a:ext cx="8229600" cy="1280160"/>
+          <a:off x="457200" y="1097280"/>
+          <a:ext cx="8229600" cy="731520"/>
         </p:xfrm>
         <a:graphic>
           <a:graphicData uri="http://schemas.openxmlformats.org/drawingml/2006/table">
@@ -3896,7 +4185,7 @@
                 <a:gridCol w="4114800"/>
                 <a:gridCol w="4114800"/>
               </a:tblGrid>
-              <a:tr h="320040">
+              <a:tr h="365760">
                 <a:tc>
                   <a:txBody>
                     <a:bodyPr/>
@@ -3928,7 +4217,7 @@
                   <a:tcPr/>
                 </a:tc>
               </a:tr>
-              <a:tr h="320040">
+              <a:tr h="365760">
                 <a:tc>
                   <a:txBody>
                     <a:bodyPr/>
@@ -3936,7 +4225,7 @@
                     <a:p>
                       <a:pPr algn="l"/>
                       <a:r>
-                        <a:t>ExtensionHarvester/Chrome</a:t>
+                        <a:t>TOTAL</a:t>
                       </a:r>
                     </a:p>
                   </a:txBody>
@@ -3949,63 +4238,7 @@
                     <a:p>
                       <a:pPr algn="ctr"/>
                       <a:r>
-                        <a:t>9</a:t>
-                      </a:r>
-                    </a:p>
-                  </a:txBody>
-                  <a:tcPr/>
-                </a:tc>
-              </a:tr>
-              <a:tr h="320040">
-                <a:tc>
-                  <a:txBody>
-                    <a:bodyPr/>
-                    <a:lstStyle/>
-                    <a:p>
-                      <a:pPr algn="l"/>
-                      <a:r>
-                        <a:t>TEST/GridPORTALTEST</a:t>
-                      </a:r>
-                    </a:p>
-                  </a:txBody>
-                  <a:tcPr/>
-                </a:tc>
-                <a:tc>
-                  <a:txBody>
-                    <a:bodyPr/>
-                    <a:lstStyle/>
-                    <a:p>
-                      <a:pPr algn="ctr"/>
-                      <a:r>
-                        <a:t>1</a:t>
-                      </a:r>
-                    </a:p>
-                  </a:txBody>
-                  <a:tcPr/>
-                </a:tc>
-              </a:tr>
-              <a:tr h="320040">
-                <a:tc>
-                  <a:txBody>
-                    <a:bodyPr/>
-                    <a:lstStyle/>
-                    <a:p>
-                      <a:pPr algn="l"/>
-                      <a:r>
-                        <a:t>TOTAL</a:t>
-                      </a:r>
-                    </a:p>
-                  </a:txBody>
-                  <a:tcPr/>
-                </a:tc>
-                <a:tc>
-                  <a:txBody>
-                    <a:bodyPr/>
-                    <a:lstStyle/>
-                    <a:p>
-                      <a:pPr algn="ctr"/>
-                      <a:r>
-                        <a:t>10</a:t>
+                        <a:t>0</a:t>
                       </a:r>
                     </a:p>
                   </a:txBody>
@@ -4042,7 +4275,7 @@
         </p:nvSpPr>
         <p:spPr>
           <a:xfrm>
-            <a:off x="457200" y="731520"/>
+            <a:off x="457200" y="457200"/>
             <a:ext cx="8229600" cy="457200"/>
           </a:xfrm>
           <a:prstGeom prst="rect">
@@ -4074,7 +4307,7 @@
           <p:nvPr/>
         </p:nvGraphicFramePr>
         <p:xfrm>
-          <a:off x="457200" y="1371600"/>
+          <a:off x="457200" y="1097280"/>
           <a:ext cx="8229600" cy="3200400"/>
         </p:xfrm>
         <a:graphic>
@@ -4429,7 +4662,7 @@
         </p:nvSpPr>
         <p:spPr>
           <a:xfrm>
-            <a:off x="457200" y="731520"/>
+            <a:off x="457200" y="457200"/>
             <a:ext cx="8229600" cy="457200"/>
           </a:xfrm>
           <a:prstGeom prst="rect">
@@ -4750,7 +4983,7 @@
           </a:solidFill>
           <a:ln>
             <a:solidFill>
-              <a:srgbClr val="006400"/>
+              <a:srgbClr val="000000"/>
             </a:solidFill>
           </a:ln>
         </p:spPr>
@@ -4769,11 +5002,188 @@
           </a:fontRef>
         </p:style>
         <p:txBody>
-          <a:bodyPr rtlCol="0" anchor="ctr" tIns="0"/>
+          <a:bodyPr rtlCol="0" anchor="ctr"/>
           <a:lstStyle/>
           <a:p>
-            <a:pPr algn="l">
-              <a:defRPr sz="1400">
+            <a:pPr algn="ctr"/>
+            <a:r>
+              <a:rPr sz="1600" b="1">
+                <a:solidFill>
+                  <a:srgbClr val="000000"/>
+                </a:solidFill>
+                <a:latin typeface="Arial"/>
+              </a:rPr>
+              <a:t>Job SLA Status</a:t>
+            </a:r>
+          </a:p>
+          <a:p>
+            <a:pPr algn="l"/>
+            <a:r>
+              <a:rPr sz="1400">
+                <a:solidFill>
+                  <a:srgbClr val="000000"/>
+                </a:solidFill>
+                <a:latin typeface="Arial"/>
+              </a:rPr>
+              <a:t>Total Done Jobs: </a:t>
+            </a:r>
+            <a:r>
+              <a:rPr sz="1400" b="1">
+                <a:solidFill>
+                  <a:srgbClr val="000000"/>
+                </a:solidFill>
+                <a:latin typeface="Arial"/>
+              </a:rPr>
+              <a:t>595</a:t>
+            </a:r>
+          </a:p>
+          <a:p>
+            <a:pPr algn="l"/>
+            <a:r>
+              <a:rPr sz="1000">
+                <a:solidFill>
+                  <a:srgbClr val="000000"/>
+                </a:solidFill>
+                <a:latin typeface="Arial"/>
+              </a:rPr>
+              <a:t>(includes duplicate hash jobs)</a:t>
+            </a:r>
+            <a:r>
+              <a:rPr sz="1400" b="1">
+                <a:solidFill>
+                  <a:srgbClr val="000000"/>
+                </a:solidFill>
+                <a:latin typeface="Arial"/>
+              </a:rPr>
+              <a:t/>
+            </a:r>
+          </a:p>
+          <a:p>
+            <a:pPr algn="l"/>
+            <a:r>
+              <a:rPr sz="1400">
+                <a:solidFill>
+                  <a:srgbClr val="000000"/>
+                </a:solidFill>
+                <a:latin typeface="Arial"/>
+              </a:rPr>
+              <a:t>Jobs Done Within SLA: </a:t>
+            </a:r>
+            <a:r>
+              <a:rPr sz="1400" b="1">
+                <a:solidFill>
+                  <a:srgbClr val="000000"/>
+                </a:solidFill>
+                <a:latin typeface="Arial"/>
+              </a:rPr>
+              <a:t>587</a:t>
+            </a:r>
+          </a:p>
+          <a:p>
+            <a:pPr algn="l"/>
+            <a:r>
+              <a:rPr sz="1400">
+                <a:solidFill>
+                  <a:srgbClr val="000000"/>
+                </a:solidFill>
+                <a:latin typeface="Arial"/>
+              </a:rPr>
+              <a:t>Jobs Done Outside SLA: </a:t>
+            </a:r>
+            <a:r>
+              <a:rPr sz="1400" b="1">
+                <a:solidFill>
+                  <a:srgbClr val="000000"/>
+                </a:solidFill>
+                <a:latin typeface="Arial"/>
+              </a:rPr>
+              <a:t>8</a:t>
+            </a:r>
+          </a:p>
+          <a:p>
+            <a:pPr algn="l"/>
+            <a:r>
+              <a:rPr sz="1400">
+                <a:solidFill>
+                  <a:srgbClr val="000000"/>
+                </a:solidFill>
+                <a:latin typeface="Arial"/>
+              </a:rPr>
+              <a:t>Overall SLA Compliance: </a:t>
+            </a:r>
+            <a:r>
+              <a:rPr sz="1400" b="1">
+                <a:solidFill>
+                  <a:srgbClr val="000000"/>
+                </a:solidFill>
+                <a:latin typeface="Arial"/>
+              </a:rPr>
+              <a:t>98.66%</a:t>
+            </a:r>
+          </a:p>
+        </p:txBody>
+      </p:sp>
+      <p:sp>
+        <p:nvSpPr>
+          <p:cNvPr id="5" name="Rounded Rectangle 4"/>
+          <p:cNvSpPr/>
+          <p:nvPr/>
+        </p:nvSpPr>
+        <p:spPr>
+          <a:xfrm>
+            <a:off x="4368800" y="3749040"/>
+            <a:ext cx="4114800" cy="1828800"/>
+          </a:xfrm>
+          <a:prstGeom prst="roundRect">
+            <a:avLst/>
+          </a:prstGeom>
+          <a:solidFill>
+            <a:srgbClr val="CCFFCC"/>
+          </a:solidFill>
+          <a:ln>
+            <a:solidFill>
+              <a:srgbClr val="000000"/>
+            </a:solidFill>
+          </a:ln>
+        </p:spPr>
+        <p:style>
+          <a:lnRef idx="1">
+            <a:schemeClr val="accent1"/>
+          </a:lnRef>
+          <a:fillRef idx="3">
+            <a:schemeClr val="accent1"/>
+          </a:fillRef>
+          <a:effectRef idx="2">
+            <a:schemeClr val="accent1"/>
+          </a:effectRef>
+          <a:fontRef idx="minor">
+            <a:schemeClr val="lt1"/>
+          </a:fontRef>
+        </p:style>
+        <p:txBody>
+          <a:bodyPr rtlCol="0" anchor="ctr"/>
+          <a:lstStyle/>
+          <a:p>
+            <a:pPr algn="l"/>
+            <a:r>
+              <a:rPr sz="1800" b="1">
+                <a:solidFill>
+                  <a:srgbClr val="000000"/>
+                </a:solidFill>
+                <a:latin typeface="Arial"/>
+              </a:rPr>
+              <a:t>Note:</a:t>
+            </a:r>
+          </a:p>
+          <a:p>
+            <a:pPr>
+              <a:spcBef>
+                <a:spcPts val="600"/>
+              </a:spcBef>
+              <a:spcAft>
+                <a:spcPts val="600"/>
+              </a:spcAft>
+              <a:defRPr sz="1200">
                 <a:solidFill>
                   <a:srgbClr val="000000"/>
                 </a:solidFill>
@@ -4781,27 +5191,26 @@
               </a:defRPr>
             </a:pPr>
             <a:r>
-              <a:t>Job SLA Status</a:t>
-            </a:r>
-            <a:br/>
-            <a:r>
-              <a:t>Total Done Jobs: 595</a:t>
-            </a:r>
-            <a:br/>
-            <a:r>
-              <a:t>(includes duplicate hash jobs)</a:t>
-            </a:r>
-            <a:br/>
-            <a:r>
-              <a:t>Jobs Done Within SLA: 587</a:t>
-            </a:r>
-            <a:br/>
-            <a:r>
-              <a:t>Jobs Done Outside SLA: 8</a:t>
-            </a:r>
-            <a:br/>
-            <a:r>
-              <a:t>Overall SLA Compliance: 98.66%</a:t>
+              <a:t>- Outside SLA are caused by delayed FRS scan results, need to manual run of Consumer Scanner &amp; to manual restart of Metadata Extractor when it hangs (no assigned on weekends)</a:t>
+            </a:r>
+          </a:p>
+          <a:p>
+            <a:pPr>
+              <a:spcBef>
+                <a:spcPts val="600"/>
+              </a:spcBef>
+              <a:spcAft>
+                <a:spcPts val="600"/>
+              </a:spcAft>
+              <a:defRPr sz="1200">
+                <a:solidFill>
+                  <a:srgbClr val="000000"/>
+                </a:solidFill>
+                <a:latin typeface="Arial"/>
+              </a:defRPr>
+            </a:pPr>
+            <a:r>
+              <a:t>- Auto-run &amp; auto-restart have already been deployed in mid May 2025</a:t>
             </a:r>
           </a:p>
         </p:txBody>
@@ -4832,7 +5241,7 @@
         </p:nvSpPr>
         <p:spPr>
           <a:xfrm>
-            <a:off x="457200" y="731520"/>
+            <a:off x="457200" y="457200"/>
             <a:ext cx="8229600" cy="457200"/>
           </a:xfrm>
           <a:prstGeom prst="rect">
@@ -4873,6 +5282,662 @@
           </a:graphicData>
         </a:graphic>
       </p:graphicFrame>
+    </p:spTree>
+  </p:cSld>
+  <p:clrMapOvr>
+    <a:masterClrMapping/>
+  </p:clrMapOvr>
+</p:sld>
+</file>
+
+<file path=ppt/slides/slide7.xml><?xml version="1.0" encoding="utf-8"?>
+<p:sld xmlns:a="http://schemas.openxmlformats.org/drawingml/2006/main" xmlns:p="http://schemas.openxmlformats.org/presentationml/2006/main" xmlns:r="http://schemas.openxmlformats.org/officeDocument/2006/relationships">
+  <p:cSld>
+    <p:spTree>
+      <p:nvGrpSpPr>
+        <p:cNvPr id="1" name=""/>
+        <p:cNvGrpSpPr/>
+        <p:nvPr/>
+      </p:nvGrpSpPr>
+      <p:grpSpPr/>
+      <p:sp>
+        <p:nvSpPr>
+          <p:cNvPr id="2" name="TextBox 1"/>
+          <p:cNvSpPr txBox="1"/>
+          <p:nvPr/>
+        </p:nvSpPr>
+        <p:spPr>
+          <a:xfrm>
+            <a:off x="457200" y="457200"/>
+            <a:ext cx="8229600" cy="457200"/>
+          </a:xfrm>
+          <a:prstGeom prst="rect">
+            <a:avLst/>
+          </a:prstGeom>
+          <a:noFill/>
+        </p:spPr>
+        <p:txBody>
+          <a:bodyPr wrap="none" anchor="ctr">
+            <a:spAutoFit/>
+          </a:bodyPr>
+          <a:lstStyle/>
+          <a:p>
+            <a:pPr algn="ctr">
+              <a:defRPr sz="2800"/>
+            </a:pPr>
+            <a:r>
+              <a:t>Job Received Count</a:t>
+            </a:r>
+          </a:p>
+        </p:txBody>
+      </p:sp>
+      <p:graphicFrame>
+        <p:nvGraphicFramePr>
+          <p:cNvPr id="3" name="Table 2"/>
+          <p:cNvGraphicFramePr>
+            <a:graphicFrameLocks noGrp="1"/>
+          </p:cNvGraphicFramePr>
+          <p:nvPr/>
+        </p:nvGraphicFramePr>
+        <p:xfrm>
+          <a:off x="457200" y="1097280"/>
+          <a:ext cx="8229600" cy="2651760"/>
+        </p:xfrm>
+        <a:graphic>
+          <a:graphicData uri="http://schemas.openxmlformats.org/drawingml/2006/table">
+            <a:tbl>
+              <a:tblPr firstRow="1" bandRow="1">
+                <a:tableStyleId>{5C22544A-7EE6-4342-B048-85BDC9FD1C3A}</a:tableStyleId>
+              </a:tblPr>
+              <a:tblGrid>
+                <a:gridCol w="2743200"/>
+                <a:gridCol w="2743200"/>
+                <a:gridCol w="2743200"/>
+              </a:tblGrid>
+              <a:tr h="294640">
+                <a:tc>
+                  <a:txBody>
+                    <a:bodyPr/>
+                    <a:lstStyle/>
+                    <a:p>
+                      <a:pPr algn="ctr">
+                        <a:defRPr sz="1800"/>
+                      </a:pPr>
+                      <a:r>
+                        <a:t>DATE</a:t>
+                      </a:r>
+                    </a:p>
+                  </a:txBody>
+                  <a:tcPr/>
+                </a:tc>
+                <a:tc>
+                  <a:txBody>
+                    <a:bodyPr/>
+                    <a:lstStyle/>
+                    <a:p>
+                      <a:pPr algn="ctr">
+                        <a:defRPr sz="1800"/>
+                      </a:pPr>
+                      <a:r>
+                        <a:t>TOTAL</a:t>
+                      </a:r>
+                    </a:p>
+                  </a:txBody>
+                  <a:tcPr/>
+                </a:tc>
+                <a:tc>
+                  <a:txBody>
+                    <a:bodyPr/>
+                    <a:lstStyle/>
+                    <a:p>
+                      <a:pPr algn="ctr">
+                        <a:defRPr sz="1800"/>
+                      </a:pPr>
+                      <a:r>
+                        <a:t>CANCELLED</a:t>
+                      </a:r>
+                    </a:p>
+                  </a:txBody>
+                  <a:tcPr/>
+                </a:tc>
+              </a:tr>
+              <a:tr h="294640">
+                <a:tc>
+                  <a:txBody>
+                    <a:bodyPr/>
+                    <a:lstStyle/>
+                    <a:p>
+                      <a:pPr algn="l"/>
+                      <a:r>
+                        <a:t>Jul 12 - Jul 19</a:t>
+                      </a:r>
+                    </a:p>
+                  </a:txBody>
+                  <a:tcPr/>
+                </a:tc>
+                <a:tc>
+                  <a:txBody>
+                    <a:bodyPr/>
+                    <a:lstStyle/>
+                    <a:p>
+                      <a:pPr algn="ctr"/>
+                      <a:r>
+                        <a:t>0</a:t>
+                      </a:r>
+                    </a:p>
+                  </a:txBody>
+                  <a:tcPr/>
+                </a:tc>
+                <a:tc>
+                  <a:txBody>
+                    <a:bodyPr/>
+                    <a:lstStyle/>
+                    <a:p>
+                      <a:pPr algn="l"/>
+                      <a:r>
+                        <a:t>0</a:t>
+                      </a:r>
+                    </a:p>
+                  </a:txBody>
+                  <a:tcPr/>
+                </a:tc>
+              </a:tr>
+              <a:tr h="294640">
+                <a:tc>
+                  <a:txBody>
+                    <a:bodyPr/>
+                    <a:lstStyle/>
+                    <a:p>
+                      <a:pPr algn="l"/>
+                      <a:r>
+                        <a:t>Jul 5 - Jul 12</a:t>
+                      </a:r>
+                    </a:p>
+                  </a:txBody>
+                  <a:tcPr/>
+                </a:tc>
+                <a:tc>
+                  <a:txBody>
+                    <a:bodyPr/>
+                    <a:lstStyle/>
+                    <a:p>
+                      <a:pPr algn="ctr"/>
+                      <a:r>
+                        <a:t>7</a:t>
+                      </a:r>
+                    </a:p>
+                  </a:txBody>
+                  <a:tcPr/>
+                </a:tc>
+                <a:tc>
+                  <a:txBody>
+                    <a:bodyPr/>
+                    <a:lstStyle/>
+                    <a:p>
+                      <a:pPr algn="l"/>
+                      <a:r>
+                        <a:t>0</a:t>
+                      </a:r>
+                    </a:p>
+                  </a:txBody>
+                  <a:tcPr/>
+                </a:tc>
+              </a:tr>
+              <a:tr h="294640">
+                <a:tc>
+                  <a:txBody>
+                    <a:bodyPr/>
+                    <a:lstStyle/>
+                    <a:p>
+                      <a:pPr algn="l"/>
+                      <a:r>
+                        <a:t>Jun 28 - Jul 5</a:t>
+                      </a:r>
+                    </a:p>
+                  </a:txBody>
+                  <a:tcPr/>
+                </a:tc>
+                <a:tc>
+                  <a:txBody>
+                    <a:bodyPr/>
+                    <a:lstStyle/>
+                    <a:p>
+                      <a:pPr algn="ctr"/>
+                      <a:r>
+                        <a:t>9,856</a:t>
+                      </a:r>
+                    </a:p>
+                  </a:txBody>
+                  <a:tcPr/>
+                </a:tc>
+                <a:tc>
+                  <a:txBody>
+                    <a:bodyPr/>
+                    <a:lstStyle/>
+                    <a:p>
+                      <a:pPr algn="l"/>
+                      <a:r>
+                        <a:t>0</a:t>
+                      </a:r>
+                    </a:p>
+                  </a:txBody>
+                  <a:tcPr/>
+                </a:tc>
+              </a:tr>
+              <a:tr h="294640">
+                <a:tc>
+                  <a:txBody>
+                    <a:bodyPr/>
+                    <a:lstStyle/>
+                    <a:p>
+                      <a:pPr algn="l"/>
+                      <a:r>
+                        <a:t>Jun 21 - Jun 28</a:t>
+                      </a:r>
+                    </a:p>
+                  </a:txBody>
+                  <a:tcPr/>
+                </a:tc>
+                <a:tc>
+                  <a:txBody>
+                    <a:bodyPr/>
+                    <a:lstStyle/>
+                    <a:p>
+                      <a:pPr algn="ctr"/>
+                      <a:r>
+                        <a:t>27</a:t>
+                      </a:r>
+                    </a:p>
+                  </a:txBody>
+                  <a:tcPr/>
+                </a:tc>
+                <a:tc>
+                  <a:txBody>
+                    <a:bodyPr/>
+                    <a:lstStyle/>
+                    <a:p>
+                      <a:pPr algn="l"/>
+                      <a:r>
+                        <a:t>0</a:t>
+                      </a:r>
+                    </a:p>
+                  </a:txBody>
+                  <a:tcPr/>
+                </a:tc>
+              </a:tr>
+              <a:tr h="294640">
+                <a:tc>
+                  <a:txBody>
+                    <a:bodyPr/>
+                    <a:lstStyle/>
+                    <a:p>
+                      <a:pPr algn="l"/>
+                      <a:r>
+                        <a:t>Jun 14 - Jun 21</a:t>
+                      </a:r>
+                    </a:p>
+                  </a:txBody>
+                  <a:tcPr/>
+                </a:tc>
+                <a:tc>
+                  <a:txBody>
+                    <a:bodyPr/>
+                    <a:lstStyle/>
+                    <a:p>
+                      <a:pPr algn="ctr"/>
+                      <a:r>
+                        <a:t>761</a:t>
+                      </a:r>
+                    </a:p>
+                  </a:txBody>
+                  <a:tcPr/>
+                </a:tc>
+                <a:tc>
+                  <a:txBody>
+                    <a:bodyPr/>
+                    <a:lstStyle/>
+                    <a:p>
+                      <a:pPr algn="l"/>
+                      <a:r>
+                        <a:t>0</a:t>
+                      </a:r>
+                    </a:p>
+                  </a:txBody>
+                  <a:tcPr/>
+                </a:tc>
+              </a:tr>
+              <a:tr h="294640">
+                <a:tc>
+                  <a:txBody>
+                    <a:bodyPr/>
+                    <a:lstStyle/>
+                    <a:p>
+                      <a:pPr algn="l"/>
+                      <a:r>
+                        <a:t>Jun 7 - Jun 14</a:t>
+                      </a:r>
+                    </a:p>
+                  </a:txBody>
+                  <a:tcPr/>
+                </a:tc>
+                <a:tc>
+                  <a:txBody>
+                    <a:bodyPr/>
+                    <a:lstStyle/>
+                    <a:p>
+                      <a:pPr algn="ctr"/>
+                      <a:r>
+                        <a:t>56,527</a:t>
+                      </a:r>
+                    </a:p>
+                  </a:txBody>
+                  <a:tcPr/>
+                </a:tc>
+                <a:tc>
+                  <a:txBody>
+                    <a:bodyPr/>
+                    <a:lstStyle/>
+                    <a:p>
+                      <a:pPr algn="l"/>
+                      <a:r>
+                        <a:t>0</a:t>
+                      </a:r>
+                    </a:p>
+                  </a:txBody>
+                  <a:tcPr/>
+                </a:tc>
+              </a:tr>
+              <a:tr h="294640">
+                <a:tc>
+                  <a:txBody>
+                    <a:bodyPr/>
+                    <a:lstStyle/>
+                    <a:p>
+                      <a:pPr algn="l"/>
+                      <a:r>
+                        <a:t>May 31 - Jun 7</a:t>
+                      </a:r>
+                    </a:p>
+                  </a:txBody>
+                  <a:tcPr/>
+                </a:tc>
+                <a:tc>
+                  <a:txBody>
+                    <a:bodyPr/>
+                    <a:lstStyle/>
+                    <a:p>
+                      <a:pPr algn="ctr"/>
+                      <a:r>
+                        <a:t>8,489</a:t>
+                      </a:r>
+                    </a:p>
+                  </a:txBody>
+                  <a:tcPr/>
+                </a:tc>
+                <a:tc>
+                  <a:txBody>
+                    <a:bodyPr/>
+                    <a:lstStyle/>
+                    <a:p>
+                      <a:pPr algn="l"/>
+                      <a:r>
+                        <a:t>0</a:t>
+                      </a:r>
+                    </a:p>
+                  </a:txBody>
+                  <a:tcPr/>
+                </a:tc>
+              </a:tr>
+              <a:tr h="294640">
+                <a:tc>
+                  <a:txBody>
+                    <a:bodyPr/>
+                    <a:lstStyle/>
+                    <a:p>
+                      <a:pPr algn="l"/>
+                      <a:r>
+                        <a:t>May 24 - May 31</a:t>
+                      </a:r>
+                    </a:p>
+                  </a:txBody>
+                  <a:tcPr/>
+                </a:tc>
+                <a:tc>
+                  <a:txBody>
+                    <a:bodyPr/>
+                    <a:lstStyle/>
+                    <a:p>
+                      <a:pPr algn="ctr"/>
+                      <a:r>
+                        <a:t>14,615</a:t>
+                      </a:r>
+                    </a:p>
+                  </a:txBody>
+                  <a:tcPr/>
+                </a:tc>
+                <a:tc>
+                  <a:txBody>
+                    <a:bodyPr/>
+                    <a:lstStyle/>
+                    <a:p>
+                      <a:pPr algn="l"/>
+                      <a:r>
+                        <a:t>0</a:t>
+                      </a:r>
+                    </a:p>
+                  </a:txBody>
+                  <a:tcPr/>
+                </a:tc>
+              </a:tr>
+            </a:tbl>
+          </a:graphicData>
+        </a:graphic>
+      </p:graphicFrame>
+    </p:spTree>
+  </p:cSld>
+  <p:clrMapOvr>
+    <a:masterClrMapping/>
+  </p:clrMapOvr>
+</p:sld>
+</file>
+
+<file path=ppt/slides/slide8.xml><?xml version="1.0" encoding="utf-8"?>
+<p:sld xmlns:a="http://schemas.openxmlformats.org/drawingml/2006/main" xmlns:p="http://schemas.openxmlformats.org/presentationml/2006/main" xmlns:r="http://schemas.openxmlformats.org/officeDocument/2006/relationships">
+  <p:cSld>
+    <p:spTree>
+      <p:nvGrpSpPr>
+        <p:cNvPr id="1" name=""/>
+        <p:cNvGrpSpPr/>
+        <p:nvPr/>
+      </p:nvGrpSpPr>
+      <p:grpSpPr/>
+      <p:sp>
+        <p:nvSpPr>
+          <p:cNvPr id="2" name="TextBox 1"/>
+          <p:cNvSpPr txBox="1"/>
+          <p:nvPr/>
+        </p:nvSpPr>
+        <p:spPr>
+          <a:xfrm>
+            <a:off x="457200" y="457200"/>
+            <a:ext cx="8229600" cy="457200"/>
+          </a:xfrm>
+          <a:prstGeom prst="rect">
+            <a:avLst/>
+          </a:prstGeom>
+          <a:noFill/>
+        </p:spPr>
+        <p:txBody>
+          <a:bodyPr wrap="none" anchor="ctr">
+            <a:spAutoFit/>
+          </a:bodyPr>
+          <a:lstStyle/>
+          <a:p>
+            <a:pPr algn="ctr">
+              <a:defRPr sz="2800"/>
+            </a:pPr>
+            <a:r>
+              <a:t>Job Received Count</a:t>
+            </a:r>
+          </a:p>
+        </p:txBody>
+      </p:sp>
+      <p:graphicFrame>
+        <p:nvGraphicFramePr>
+          <p:cNvPr id="3" name="Chart 2"/>
+          <p:cNvGraphicFramePr>
+            <a:graphicFrameLocks noGrp="1"/>
+          </p:cNvGraphicFramePr>
+          <p:nvPr/>
+        </p:nvGraphicFramePr>
+        <p:xfrm>
+          <a:off x="457200" y="914400"/>
+          <a:ext cx="8229600" cy="5029200"/>
+        </p:xfrm>
+        <a:graphic>
+          <a:graphicData uri="http://schemas.openxmlformats.org/drawingml/2006/chart">
+            <c:chart xmlns:c="http://schemas.openxmlformats.org/drawingml/2006/chart" r:id="rId2"/>
+          </a:graphicData>
+        </a:graphic>
+      </p:graphicFrame>
+      <p:sp>
+        <p:nvSpPr>
+          <p:cNvPr id="4" name="Rounded Rectangle 3"/>
+          <p:cNvSpPr/>
+          <p:nvPr/>
+        </p:nvSpPr>
+        <p:spPr>
+          <a:xfrm>
+            <a:off x="5943600" y="5669280"/>
+            <a:ext cx="2743200" cy="1097280"/>
+          </a:xfrm>
+          <a:prstGeom prst="roundRect">
+            <a:avLst/>
+          </a:prstGeom>
+          <a:solidFill>
+            <a:srgbClr val="CCFFCC"/>
+          </a:solidFill>
+          <a:ln>
+            <a:solidFill>
+              <a:srgbClr val="000000"/>
+            </a:solidFill>
+          </a:ln>
+        </p:spPr>
+        <p:style>
+          <a:lnRef idx="1">
+            <a:schemeClr val="accent1"/>
+          </a:lnRef>
+          <a:fillRef idx="3">
+            <a:schemeClr val="accent1"/>
+          </a:fillRef>
+          <a:effectRef idx="2">
+            <a:schemeClr val="accent1"/>
+          </a:effectRef>
+          <a:fontRef idx="minor">
+            <a:schemeClr val="lt1"/>
+          </a:fontRef>
+        </p:style>
+        <p:txBody>
+          <a:bodyPr rtlCol="0" anchor="ctr"/>
+          <a:lstStyle/>
+          <a:p>
+            <a:pPr algn="ctr"/>
+            <a:r>
+              <a:rPr sz="1400" b="1">
+                <a:solidFill>
+                  <a:srgbClr val="000000"/>
+                </a:solidFill>
+                <a:latin typeface="Arial"/>
+              </a:rPr>
+              <a:t>Total Job Received Count</a:t>
+            </a:r>
+          </a:p>
+          <a:p>
+            <a:pPr algn="l"/>
+            <a:r>
+              <a:rPr sz="1100">
+                <a:solidFill>
+                  <a:srgbClr val="000000"/>
+                </a:solidFill>
+                <a:latin typeface="Arial"/>
+              </a:rPr>
+              <a:t>Total Jobs: </a:t>
+            </a:r>
+            <a:r>
+              <a:rPr sz="1300" b="1">
+                <a:solidFill>
+                  <a:srgbClr val="000000"/>
+                </a:solidFill>
+                <a:latin typeface="Arial"/>
+              </a:rPr>
+              <a:t>90,282</a:t>
+            </a:r>
+          </a:p>
+          <a:p>
+            <a:pPr algn="l"/>
+            <a:r>
+              <a:rPr sz="1100">
+                <a:solidFill>
+                  <a:srgbClr val="000000"/>
+                </a:solidFill>
+                <a:latin typeface="Arial"/>
+              </a:rPr>
+              <a:t>Jobs Done Within SLA: </a:t>
+            </a:r>
+            <a:r>
+              <a:rPr sz="1300" b="1">
+                <a:solidFill>
+                  <a:srgbClr val="000000"/>
+                </a:solidFill>
+                <a:latin typeface="Arial"/>
+              </a:rPr>
+              <a:t>0</a:t>
+            </a:r>
+          </a:p>
+          <a:p>
+            <a:pPr algn="l"/>
+            <a:r>
+              <a:rPr sz="800">
+                <a:solidFill>
+                  <a:srgbClr val="000000"/>
+                </a:solidFill>
+                <a:latin typeface="Arial"/>
+              </a:rPr>
+              <a:t>Note:</a:t>
+            </a:r>
+            <a:r>
+              <a:rPr sz="1300" b="1">
+                <a:solidFill>
+                  <a:srgbClr val="000000"/>
+                </a:solidFill>
+                <a:latin typeface="Arial"/>
+              </a:rPr>
+              <a:t/>
+            </a:r>
+          </a:p>
+          <a:p>
+            <a:pPr algn="l"/>
+            <a:r>
+              <a:rPr sz="800">
+                <a:solidFill>
+                  <a:srgbClr val="000000"/>
+                </a:solidFill>
+                <a:latin typeface="Arial"/>
+              </a:rPr>
+              <a:t>- Data shown includes  possible duplicate submission</a:t>
+            </a:r>
+            <a:r>
+              <a:rPr sz="1300" b="1">
+                <a:solidFill>
+                  <a:srgbClr val="000000"/>
+                </a:solidFill>
+                <a:latin typeface="Arial"/>
+              </a:rPr>
+              <a:t/>
+            </a:r>
+          </a:p>
+        </p:txBody>
+      </p:sp>
     </p:spTree>
   </p:cSld>
   <p:clrMapOvr>

</xml_diff>